<commit_message>
bc glm w quantile plots
</commit_message>
<xml_diff>
--- a/pptx/glm_microplastics_water_v2.pptx
+++ b/pptx/glm_microplastics_water_v2.pptx
@@ -7,24 +7,32 @@
   <p:sldIdLst>
     <p:sldId id="257" r:id="rId2"/>
     <p:sldId id="269" r:id="rId3"/>
-    <p:sldId id="258" r:id="rId4"/>
-    <p:sldId id="267" r:id="rId5"/>
-    <p:sldId id="259" r:id="rId6"/>
-    <p:sldId id="268" r:id="rId7"/>
-    <p:sldId id="260" r:id="rId8"/>
-    <p:sldId id="270" r:id="rId9"/>
-    <p:sldId id="261" r:id="rId10"/>
-    <p:sldId id="271" r:id="rId11"/>
-    <p:sldId id="272" r:id="rId12"/>
-    <p:sldId id="262" r:id="rId13"/>
-    <p:sldId id="273" r:id="rId14"/>
-    <p:sldId id="263" r:id="rId15"/>
-    <p:sldId id="274" r:id="rId16"/>
-    <p:sldId id="264" r:id="rId17"/>
-    <p:sldId id="275" r:id="rId18"/>
-    <p:sldId id="265" r:id="rId19"/>
-    <p:sldId id="276" r:id="rId20"/>
-    <p:sldId id="266" r:id="rId21"/>
+    <p:sldId id="277" r:id="rId4"/>
+    <p:sldId id="258" r:id="rId5"/>
+    <p:sldId id="267" r:id="rId6"/>
+    <p:sldId id="278" r:id="rId7"/>
+    <p:sldId id="259" r:id="rId8"/>
+    <p:sldId id="268" r:id="rId9"/>
+    <p:sldId id="279" r:id="rId10"/>
+    <p:sldId id="260" r:id="rId11"/>
+    <p:sldId id="270" r:id="rId12"/>
+    <p:sldId id="280" r:id="rId13"/>
+    <p:sldId id="261" r:id="rId14"/>
+    <p:sldId id="271" r:id="rId15"/>
+    <p:sldId id="272" r:id="rId16"/>
+    <p:sldId id="281" r:id="rId17"/>
+    <p:sldId id="262" r:id="rId18"/>
+    <p:sldId id="273" r:id="rId19"/>
+    <p:sldId id="282" r:id="rId20"/>
+    <p:sldId id="263" r:id="rId21"/>
+    <p:sldId id="274" r:id="rId22"/>
+    <p:sldId id="283" r:id="rId23"/>
+    <p:sldId id="264" r:id="rId24"/>
+    <p:sldId id="275" r:id="rId25"/>
+    <p:sldId id="284" r:id="rId26"/>
+    <p:sldId id="265" r:id="rId27"/>
+    <p:sldId id="276" r:id="rId28"/>
+    <p:sldId id="266" r:id="rId29"/>
   </p:sldIdLst>
   <p:sldSz cx="12192000" cy="6858000"/>
   <p:notesSz cx="6858000" cy="9144000"/>
@@ -278,7 +286,7 @@
           <a:p>
             <a:fld id="{D8B46044-EB6B-44D7-A92E-D50D0E12EF7C}" type="datetimeFigureOut">
               <a:rPr lang="en-US" smtClean="0"/>
-              <a:t>5/20/2024</a:t>
+              <a:t>5/23/2024</a:t>
             </a:fld>
             <a:endParaRPr lang="en-US"/>
           </a:p>
@@ -476,7 +484,7 @@
           <a:p>
             <a:fld id="{D8B46044-EB6B-44D7-A92E-D50D0E12EF7C}" type="datetimeFigureOut">
               <a:rPr lang="en-US" smtClean="0"/>
-              <a:t>5/20/2024</a:t>
+              <a:t>5/23/2024</a:t>
             </a:fld>
             <a:endParaRPr lang="en-US"/>
           </a:p>
@@ -684,7 +692,7 @@
           <a:p>
             <a:fld id="{D8B46044-EB6B-44D7-A92E-D50D0E12EF7C}" type="datetimeFigureOut">
               <a:rPr lang="en-US" smtClean="0"/>
-              <a:t>5/20/2024</a:t>
+              <a:t>5/23/2024</a:t>
             </a:fld>
             <a:endParaRPr lang="en-US"/>
           </a:p>
@@ -882,7 +890,7 @@
           <a:p>
             <a:fld id="{D8B46044-EB6B-44D7-A92E-D50D0E12EF7C}" type="datetimeFigureOut">
               <a:rPr lang="en-US" smtClean="0"/>
-              <a:t>5/20/2024</a:t>
+              <a:t>5/23/2024</a:t>
             </a:fld>
             <a:endParaRPr lang="en-US"/>
           </a:p>
@@ -1157,7 +1165,7 @@
           <a:p>
             <a:fld id="{D8B46044-EB6B-44D7-A92E-D50D0E12EF7C}" type="datetimeFigureOut">
               <a:rPr lang="en-US" smtClean="0"/>
-              <a:t>5/20/2024</a:t>
+              <a:t>5/23/2024</a:t>
             </a:fld>
             <a:endParaRPr lang="en-US"/>
           </a:p>
@@ -1422,7 +1430,7 @@
           <a:p>
             <a:fld id="{D8B46044-EB6B-44D7-A92E-D50D0E12EF7C}" type="datetimeFigureOut">
               <a:rPr lang="en-US" smtClean="0"/>
-              <a:t>5/20/2024</a:t>
+              <a:t>5/23/2024</a:t>
             </a:fld>
             <a:endParaRPr lang="en-US"/>
           </a:p>
@@ -1834,7 +1842,7 @@
           <a:p>
             <a:fld id="{D8B46044-EB6B-44D7-A92E-D50D0E12EF7C}" type="datetimeFigureOut">
               <a:rPr lang="en-US" smtClean="0"/>
-              <a:t>5/20/2024</a:t>
+              <a:t>5/23/2024</a:t>
             </a:fld>
             <a:endParaRPr lang="en-US"/>
           </a:p>
@@ -1975,7 +1983,7 @@
           <a:p>
             <a:fld id="{D8B46044-EB6B-44D7-A92E-D50D0E12EF7C}" type="datetimeFigureOut">
               <a:rPr lang="en-US" smtClean="0"/>
-              <a:t>5/20/2024</a:t>
+              <a:t>5/23/2024</a:t>
             </a:fld>
             <a:endParaRPr lang="en-US"/>
           </a:p>
@@ -2088,7 +2096,7 @@
           <a:p>
             <a:fld id="{D8B46044-EB6B-44D7-A92E-D50D0E12EF7C}" type="datetimeFigureOut">
               <a:rPr lang="en-US" smtClean="0"/>
-              <a:t>5/20/2024</a:t>
+              <a:t>5/23/2024</a:t>
             </a:fld>
             <a:endParaRPr lang="en-US"/>
           </a:p>
@@ -2399,7 +2407,7 @@
           <a:p>
             <a:fld id="{D8B46044-EB6B-44D7-A92E-D50D0E12EF7C}" type="datetimeFigureOut">
               <a:rPr lang="en-US" smtClean="0"/>
-              <a:t>5/20/2024</a:t>
+              <a:t>5/23/2024</a:t>
             </a:fld>
             <a:endParaRPr lang="en-US"/>
           </a:p>
@@ -2687,7 +2695,7 @@
           <a:p>
             <a:fld id="{D8B46044-EB6B-44D7-A92E-D50D0E12EF7C}" type="datetimeFigureOut">
               <a:rPr lang="en-US" smtClean="0"/>
-              <a:t>5/20/2024</a:t>
+              <a:t>5/23/2024</a:t>
             </a:fld>
             <a:endParaRPr lang="en-US"/>
           </a:p>
@@ -2928,7 +2936,7 @@
           <a:p>
             <a:fld id="{D8B46044-EB6B-44D7-A92E-D50D0E12EF7C}" type="datetimeFigureOut">
               <a:rPr lang="en-US" smtClean="0"/>
-              <a:t>5/20/2024</a:t>
+              <a:t>5/23/2024</a:t>
             </a:fld>
             <a:endParaRPr lang="en-US"/>
           </a:p>
@@ -3475,7 +3483,7 @@
                 <a:ea typeface="Calibri" panose="020F0502020204030204" pitchFamily="34" charset="0"/>
                 <a:cs typeface="Times New Roman" panose="02020603050405020304" pitchFamily="18" charset="0"/>
               </a:rPr>
-              <a:t>. The choice of the Gaussian family and identity link assumes that the response variable is normally distributed and linearly related to the additive effects of the categorical predictors. We examined the model summary to assess the significance of each factor's coefficients, which represent the expected change in biomarker expression for each factor level compared to the reference level. We repeated thes</a:t>
+              <a:t>. Biomarker responses were normal transformed by finding the optimal lambda for a Box-Cox transformation. The choice of the Gaussian family and identity link assumes that the response variable is normally distributed and linearly related to the additive effects of the categorical predictors. We examined the model summary to assess the significance of each factor's coefficients, which represent the expected change in biomarker expression for each factor level compared to the reference level. We repeated thes</a:t>
             </a:r>
             <a:r>
               <a:rPr lang="en-US" sz="1800" kern="100" dirty="0">
@@ -3502,7 +3510,7 @@
                 <a:ea typeface="Calibri" panose="020F0502020204030204" pitchFamily="34" charset="0"/>
                 <a:cs typeface="Times New Roman" panose="02020603050405020304" pitchFamily="18" charset="0"/>
               </a:rPr>
-              <a:t>I have a question on how we want to handle time step 0 for microplastics. I have not removed the fb level and not sure if we want to insert 0 concentrations for week 0 for each of the response variables for microplastics (to have the same dimensions as water data).</a:t>
+              <a:t>I have removed the fb level and inserted 0 concentrations for week 0 for each of the response variables for microplastics (to have the same dimensions as water data).</a:t>
             </a:r>
             <a:endParaRPr lang="en-US" sz="1800" kern="100" dirty="0">
               <a:effectLst/>
@@ -3565,7 +3573,7 @@
         <p:spPr>
           <a:xfrm>
             <a:off x="165093" y="365124"/>
-            <a:ext cx="2802278" cy="3063875"/>
+            <a:ext cx="2205574" cy="3063875"/>
           </a:xfrm>
         </p:spPr>
         <p:txBody>
@@ -3576,7 +3584,7 @@
           <a:p>
             <a:r>
               <a:rPr lang="en-US" sz="3200" dirty="0"/>
-              <a:t>P. aeruginosa </a:t>
+              <a:t>Sul1 </a:t>
             </a:r>
             <a:r>
               <a:rPr lang="en-US" sz="3200" dirty="0" err="1"/>
@@ -3584,24 +3592,50 @@
             </a:r>
             <a:r>
               <a:rPr lang="en-US" sz="3200" dirty="0"/>
-              <a:t> step</a:t>
+              <a:t> full </a:t>
+            </a:r>
+            <a:r>
+              <a:rPr lang="en-US" sz="3200" dirty="0" err="1"/>
+              <a:t>glm</a:t>
             </a:r>
             <a:br>
               <a:rPr lang="en-US" sz="3200" dirty="0"/>
             </a:br>
             <a:r>
               <a:rPr lang="en-US" sz="3200" dirty="0"/>
-              <a:t>- time kept and now significant for both linear and quadratic</a:t>
+              <a:t>-</a:t>
+            </a:r>
+            <a:r>
+              <a:rPr lang="en-US" sz="3200" dirty="0" err="1"/>
+              <a:t>ldpe</a:t>
+            </a:r>
+            <a:br>
+              <a:rPr lang="en-US" sz="3200" dirty="0"/>
+            </a:br>
+            <a:r>
+              <a:rPr lang="en-US" sz="3200" dirty="0"/>
+              <a:t>-</a:t>
+            </a:r>
+            <a:r>
+              <a:rPr lang="en-US" sz="3200" dirty="0" err="1"/>
+              <a:t>tww</a:t>
+            </a:r>
+            <a:br>
+              <a:rPr lang="en-US" sz="3200" dirty="0"/>
+            </a:br>
+            <a:r>
+              <a:rPr lang="en-US" sz="3200" dirty="0"/>
+              <a:t>-time quadratic</a:t>
             </a:r>
           </a:p>
         </p:txBody>
       </p:sp>
       <p:pic>
         <p:nvPicPr>
-          <p:cNvPr id="4" name="Picture 3">
-            <a:extLst>
-              <a:ext uri="{FF2B5EF4-FFF2-40B4-BE49-F238E27FC236}">
-                <a16:creationId xmlns:a16="http://schemas.microsoft.com/office/drawing/2014/main" id="{95E50185-04E3-DCC0-1574-73FCAE7516BE}"/>
+          <p:cNvPr id="5" name="Picture 4">
+            <a:extLst>
+              <a:ext uri="{FF2B5EF4-FFF2-40B4-BE49-F238E27FC236}">
+                <a16:creationId xmlns:a16="http://schemas.microsoft.com/office/drawing/2014/main" id="{34A95C8F-3B63-CCF5-CED3-67E6F3D400DB}"/>
               </a:ext>
             </a:extLst>
           </p:cNvPr>
@@ -3618,8 +3652,8 @@
         </p:blipFill>
         <p:spPr>
           <a:xfrm>
-            <a:off x="2967371" y="784534"/>
-            <a:ext cx="9305069" cy="4837331"/>
+            <a:off x="2522898" y="269772"/>
+            <a:ext cx="9659258" cy="5868561"/>
           </a:xfrm>
           <a:prstGeom prst="rect">
             <a:avLst/>
@@ -3629,7 +3663,7 @@
     </p:spTree>
     <p:extLst>
       <p:ext uri="{BB962C8B-B14F-4D97-AF65-F5344CB8AC3E}">
-        <p14:creationId xmlns:p14="http://schemas.microsoft.com/office/powerpoint/2010/main" val="2585886771"/>
+        <p14:creationId xmlns:p14="http://schemas.microsoft.com/office/powerpoint/2010/main" val="2800811628"/>
       </p:ext>
     </p:extLst>
   </p:cSld>
@@ -3661,7 +3695,7 @@
           <p:cNvPr id="2" name="Title 1">
             <a:extLst>
               <a:ext uri="{FF2B5EF4-FFF2-40B4-BE49-F238E27FC236}">
-                <a16:creationId xmlns:a16="http://schemas.microsoft.com/office/drawing/2014/main" id="{581E850A-7C7B-42A5-5294-7AA8006F3F71}"/>
+                <a16:creationId xmlns:a16="http://schemas.microsoft.com/office/drawing/2014/main" id="{3E4A6795-1948-05E4-E562-AFED99BDA8EB}"/>
               </a:ext>
             </a:extLst>
           </p:cNvPr>
@@ -3672,24 +3706,53 @@
             <p:ph type="title"/>
           </p:nvPr>
         </p:nvSpPr>
-        <p:spPr/>
-        <p:txBody>
-          <a:bodyPr/>
-          <a:lstStyle/>
-          <a:p>
-            <a:r>
-              <a:rPr lang="en-US" dirty="0"/>
-              <a:t>Data</a:t>
+        <p:spPr>
+          <a:xfrm>
+            <a:off x="165093" y="365124"/>
+            <a:ext cx="2802278" cy="3063875"/>
+          </a:xfrm>
+        </p:spPr>
+        <p:txBody>
+          <a:bodyPr>
+            <a:normAutofit/>
+          </a:bodyPr>
+          <a:lstStyle/>
+          <a:p>
+            <a:r>
+              <a:rPr lang="en-US" sz="3200" dirty="0"/>
+              <a:t>Sul1 </a:t>
+            </a:r>
+            <a:r>
+              <a:rPr lang="en-US" sz="3200" dirty="0" err="1"/>
+              <a:t>mp</a:t>
+            </a:r>
+            <a:r>
+              <a:rPr lang="en-US" sz="3200" dirty="0"/>
+              <a:t> step</a:t>
+            </a:r>
+            <a:br>
+              <a:rPr lang="en-US" sz="3200" dirty="0"/>
+            </a:br>
+            <a:r>
+              <a:rPr lang="en-US" sz="3200" dirty="0"/>
+              <a:t>-everything kept</a:t>
+            </a:r>
+            <a:br>
+              <a:rPr lang="en-US" sz="3200" dirty="0"/>
+            </a:br>
+            <a:r>
+              <a:rPr lang="en-US" sz="3200" dirty="0"/>
+              <a:t>-time quadratic</a:t>
             </a:r>
           </a:p>
         </p:txBody>
       </p:sp>
       <p:pic>
         <p:nvPicPr>
-          <p:cNvPr id="5" name="Picture 4">
-            <a:extLst>
-              <a:ext uri="{FF2B5EF4-FFF2-40B4-BE49-F238E27FC236}">
-                <a16:creationId xmlns:a16="http://schemas.microsoft.com/office/drawing/2014/main" id="{0F04D610-142D-DA6C-F1BB-33C1CBF02886}"/>
+          <p:cNvPr id="4" name="Picture 3">
+            <a:extLst>
+              <a:ext uri="{FF2B5EF4-FFF2-40B4-BE49-F238E27FC236}">
+                <a16:creationId xmlns:a16="http://schemas.microsoft.com/office/drawing/2014/main" id="{C2860583-85BD-F14A-501D-0D27502CA973}"/>
               </a:ext>
             </a:extLst>
           </p:cNvPr>
@@ -3706,8 +3769,8 @@
         </p:blipFill>
         <p:spPr>
           <a:xfrm>
-            <a:off x="4595201" y="108079"/>
-            <a:ext cx="4430266" cy="6384796"/>
+            <a:off x="3036806" y="609599"/>
+            <a:ext cx="9112906" cy="5579533"/>
           </a:xfrm>
           <a:prstGeom prst="rect">
             <a:avLst/>
@@ -3717,7 +3780,7 @@
     </p:spTree>
     <p:extLst>
       <p:ext uri="{BB962C8B-B14F-4D97-AF65-F5344CB8AC3E}">
-        <p14:creationId xmlns:p14="http://schemas.microsoft.com/office/powerpoint/2010/main" val="1295834067"/>
+        <p14:creationId xmlns:p14="http://schemas.microsoft.com/office/powerpoint/2010/main" val="3020057500"/>
       </p:ext>
     </p:extLst>
   </p:cSld>
@@ -3744,66 +3807,12 @@
           <a:chExt cx="0" cy="0"/>
         </a:xfrm>
       </p:grpSpPr>
-      <p:sp>
-        <p:nvSpPr>
-          <p:cNvPr id="2" name="Title 1">
-            <a:extLst>
-              <a:ext uri="{FF2B5EF4-FFF2-40B4-BE49-F238E27FC236}">
-                <a16:creationId xmlns:a16="http://schemas.microsoft.com/office/drawing/2014/main" id="{3E4A6795-1948-05E4-E562-AFED99BDA8EB}"/>
-              </a:ext>
-            </a:extLst>
-          </p:cNvPr>
-          <p:cNvSpPr>
-            <a:spLocks noGrp="1"/>
-          </p:cNvSpPr>
-          <p:nvPr>
-            <p:ph type="title"/>
-          </p:nvPr>
-        </p:nvSpPr>
-        <p:spPr>
-          <a:xfrm>
-            <a:off x="165093" y="365124"/>
-            <a:ext cx="2802278" cy="3063875"/>
-          </a:xfrm>
-        </p:spPr>
-        <p:txBody>
-          <a:bodyPr>
-            <a:normAutofit fontScale="90000"/>
-          </a:bodyPr>
-          <a:lstStyle/>
-          <a:p>
-            <a:r>
-              <a:rPr lang="en-US" sz="3200" dirty="0"/>
-              <a:t>S </a:t>
-            </a:r>
-            <a:r>
-              <a:rPr lang="en-US" sz="3200" dirty="0" err="1"/>
-              <a:t>maltophilia</a:t>
-            </a:r>
-            <a:r>
-              <a:rPr lang="en-US" sz="3200" dirty="0"/>
-              <a:t> water full </a:t>
-            </a:r>
-            <a:r>
-              <a:rPr lang="en-US" sz="3200" dirty="0" err="1"/>
-              <a:t>glm</a:t>
-            </a:r>
-            <a:br>
-              <a:rPr lang="en-US" sz="3200" dirty="0"/>
-            </a:br>
-            <a:r>
-              <a:rPr lang="en-US" sz="3200" dirty="0"/>
-              <a:t>--there does seem to be a linear/quadratic trend over time here</a:t>
-            </a:r>
-          </a:p>
-        </p:txBody>
-      </p:sp>
       <p:pic>
         <p:nvPicPr>
-          <p:cNvPr id="8" name="Picture 7">
-            <a:extLst>
-              <a:ext uri="{FF2B5EF4-FFF2-40B4-BE49-F238E27FC236}">
-                <a16:creationId xmlns:a16="http://schemas.microsoft.com/office/drawing/2014/main" id="{045CB1C0-171D-431C-03FE-681274DEDD20}"/>
+          <p:cNvPr id="5" name="Picture 4">
+            <a:extLst>
+              <a:ext uri="{FF2B5EF4-FFF2-40B4-BE49-F238E27FC236}">
+                <a16:creationId xmlns:a16="http://schemas.microsoft.com/office/drawing/2014/main" id="{C89A8D0F-4785-793E-5F59-940560DDD98D}"/>
               </a:ext>
             </a:extLst>
           </p:cNvPr>
@@ -3820,18 +3829,55 @@
         </p:blipFill>
         <p:spPr>
           <a:xfrm>
-            <a:off x="3400282" y="628573"/>
-            <a:ext cx="8561318" cy="4569959"/>
+            <a:off x="3249768" y="1086678"/>
+            <a:ext cx="8472672" cy="5571747"/>
           </a:xfrm>
           <a:prstGeom prst="rect">
             <a:avLst/>
           </a:prstGeom>
         </p:spPr>
       </p:pic>
+      <p:sp>
+        <p:nvSpPr>
+          <p:cNvPr id="2" name="Title 1">
+            <a:extLst>
+              <a:ext uri="{FF2B5EF4-FFF2-40B4-BE49-F238E27FC236}">
+                <a16:creationId xmlns:a16="http://schemas.microsoft.com/office/drawing/2014/main" id="{9C84FB5B-3548-57AF-0BDE-3735ECDD4D50}"/>
+              </a:ext>
+            </a:extLst>
+          </p:cNvPr>
+          <p:cNvSpPr>
+            <a:spLocks noGrp="1"/>
+          </p:cNvSpPr>
+          <p:nvPr>
+            <p:ph type="title"/>
+          </p:nvPr>
+        </p:nvSpPr>
+        <p:spPr>
+          <a:xfrm>
+            <a:off x="0" y="0"/>
+            <a:ext cx="4664765" cy="1603513"/>
+          </a:xfrm>
+        </p:spPr>
+        <p:txBody>
+          <a:bodyPr/>
+          <a:lstStyle/>
+          <a:p>
+            <a:r>
+              <a:rPr lang="en-US" dirty="0" err="1"/>
+              <a:t>S_maltophilia</a:t>
+            </a:r>
+            <a:r>
+              <a:rPr lang="en-US" dirty="0"/>
+              <a:t> data transformation</a:t>
+            </a:r>
+          </a:p>
+        </p:txBody>
+      </p:sp>
     </p:spTree>
     <p:extLst>
       <p:ext uri="{BB962C8B-B14F-4D97-AF65-F5344CB8AC3E}">
-        <p14:creationId xmlns:p14="http://schemas.microsoft.com/office/powerpoint/2010/main" val="876230889"/>
+        <p14:creationId xmlns:p14="http://schemas.microsoft.com/office/powerpoint/2010/main" val="2129978245"/>
       </p:ext>
     </p:extLst>
   </p:cSld>
@@ -3876,48 +3922,48 @@
         </p:nvSpPr>
         <p:spPr>
           <a:xfrm>
-            <a:off x="165093" y="365124"/>
-            <a:ext cx="2802278" cy="3063875"/>
+            <a:off x="97360" y="847724"/>
+            <a:ext cx="2380029" cy="3063875"/>
           </a:xfrm>
         </p:spPr>
         <p:txBody>
           <a:bodyPr>
-            <a:normAutofit fontScale="90000"/>
+            <a:normAutofit/>
           </a:bodyPr>
           <a:lstStyle/>
           <a:p>
             <a:r>
               <a:rPr lang="en-US" sz="3200" dirty="0"/>
-              <a:t>S </a:t>
+              <a:t>P. aeruginosa </a:t>
             </a:r>
             <a:r>
               <a:rPr lang="en-US" sz="3200" dirty="0" err="1"/>
-              <a:t>maltophilia</a:t>
-            </a:r>
-            <a:r>
-              <a:rPr lang="en-US" sz="3200" dirty="0"/>
-              <a:t> water step</a:t>
+              <a:t>mp</a:t>
+            </a:r>
+            <a:r>
+              <a:rPr lang="en-US" sz="3200" dirty="0"/>
+              <a:t> full </a:t>
+            </a:r>
+            <a:r>
+              <a:rPr lang="en-US" sz="3200" dirty="0" err="1"/>
+              <a:t>glm</a:t>
             </a:r>
             <a:br>
               <a:rPr lang="en-US" sz="3200" dirty="0"/>
             </a:br>
             <a:r>
               <a:rPr lang="en-US" sz="3200" dirty="0"/>
-              <a:t>--time trend remains for step() implementation</a:t>
-            </a:r>
-            <a:br>
-              <a:rPr lang="en-US" sz="3200" dirty="0"/>
-            </a:br>
-            <a:endParaRPr lang="en-US" sz="3200" dirty="0"/>
+              <a:t>-time quadratic with p=0.1</a:t>
+            </a:r>
           </a:p>
         </p:txBody>
       </p:sp>
       <p:pic>
         <p:nvPicPr>
-          <p:cNvPr id="6" name="Picture 5">
-            <a:extLst>
-              <a:ext uri="{FF2B5EF4-FFF2-40B4-BE49-F238E27FC236}">
-                <a16:creationId xmlns:a16="http://schemas.microsoft.com/office/drawing/2014/main" id="{F0D4CAA0-037E-E805-B857-22DCB63BAFF1}"/>
+          <p:cNvPr id="5" name="Picture 4">
+            <a:extLst>
+              <a:ext uri="{FF2B5EF4-FFF2-40B4-BE49-F238E27FC236}">
+                <a16:creationId xmlns:a16="http://schemas.microsoft.com/office/drawing/2014/main" id="{9721CBB1-14D9-DF8C-F14D-DCD4F9809A35}"/>
               </a:ext>
             </a:extLst>
           </p:cNvPr>
@@ -3934,8 +3980,8 @@
         </p:blipFill>
         <p:spPr>
           <a:xfrm>
-            <a:off x="3245779" y="411084"/>
-            <a:ext cx="8845529" cy="5286983"/>
+            <a:off x="2545122" y="77159"/>
+            <a:ext cx="9728919" cy="5773308"/>
           </a:xfrm>
           <a:prstGeom prst="rect">
             <a:avLst/>
@@ -3945,7 +3991,7 @@
     </p:spTree>
     <p:extLst>
       <p:ext uri="{BB962C8B-B14F-4D97-AF65-F5344CB8AC3E}">
-        <p14:creationId xmlns:p14="http://schemas.microsoft.com/office/powerpoint/2010/main" val="1805507326"/>
+        <p14:creationId xmlns:p14="http://schemas.microsoft.com/office/powerpoint/2010/main" val="1248416635"/>
       </p:ext>
     </p:extLst>
   </p:cSld>
@@ -3990,47 +4036,44 @@
         </p:nvSpPr>
         <p:spPr>
           <a:xfrm>
-            <a:off x="309026" y="1118658"/>
+            <a:off x="165093" y="365124"/>
             <a:ext cx="2802278" cy="3063875"/>
           </a:xfrm>
         </p:spPr>
         <p:txBody>
           <a:bodyPr>
-            <a:normAutofit fontScale="90000"/>
+            <a:normAutofit/>
           </a:bodyPr>
           <a:lstStyle/>
           <a:p>
             <a:r>
               <a:rPr lang="en-US" sz="3200" dirty="0"/>
-              <a:t>Int1 water full </a:t>
+              <a:t>P. aeruginosa </a:t>
             </a:r>
             <a:r>
               <a:rPr lang="en-US" sz="3200" dirty="0" err="1"/>
-              <a:t>glm</a:t>
+              <a:t>mp</a:t>
+            </a:r>
+            <a:r>
+              <a:rPr lang="en-US" sz="3200" dirty="0"/>
+              <a:t> step</a:t>
             </a:r>
             <a:br>
               <a:rPr lang="en-US" sz="3200" dirty="0"/>
             </a:br>
             <a:r>
               <a:rPr lang="en-US" sz="3200" dirty="0"/>
-              <a:t>--TWW significant vs river water</a:t>
-            </a:r>
-            <a:br>
-              <a:rPr lang="en-US" sz="3200" dirty="0"/>
-            </a:br>
-            <a:r>
-              <a:rPr lang="en-US" sz="3200" dirty="0"/>
-              <a:t>--linear time trend also present</a:t>
+              <a:t>- time kept and now significant for both linear and quadratic</a:t>
             </a:r>
           </a:p>
         </p:txBody>
       </p:sp>
       <p:pic>
         <p:nvPicPr>
-          <p:cNvPr id="5" name="Picture 4">
-            <a:extLst>
-              <a:ext uri="{FF2B5EF4-FFF2-40B4-BE49-F238E27FC236}">
-                <a16:creationId xmlns:a16="http://schemas.microsoft.com/office/drawing/2014/main" id="{CAF85615-64CF-0402-2140-27C4142A795D}"/>
+          <p:cNvPr id="4" name="Picture 3">
+            <a:extLst>
+              <a:ext uri="{FF2B5EF4-FFF2-40B4-BE49-F238E27FC236}">
+                <a16:creationId xmlns:a16="http://schemas.microsoft.com/office/drawing/2014/main" id="{95E50185-04E3-DCC0-1574-73FCAE7516BE}"/>
               </a:ext>
             </a:extLst>
           </p:cNvPr>
@@ -4047,8 +4090,8 @@
         </p:blipFill>
         <p:spPr>
           <a:xfrm>
-            <a:off x="3597146" y="365124"/>
-            <a:ext cx="8594101" cy="5045076"/>
+            <a:off x="2967371" y="784534"/>
+            <a:ext cx="9305069" cy="4837331"/>
           </a:xfrm>
           <a:prstGeom prst="rect">
             <a:avLst/>
@@ -4058,7 +4101,7 @@
     </p:spTree>
     <p:extLst>
       <p:ext uri="{BB962C8B-B14F-4D97-AF65-F5344CB8AC3E}">
-        <p14:creationId xmlns:p14="http://schemas.microsoft.com/office/powerpoint/2010/main" val="1042782054"/>
+        <p14:creationId xmlns:p14="http://schemas.microsoft.com/office/powerpoint/2010/main" val="2585886771"/>
       </p:ext>
     </p:extLst>
   </p:cSld>
@@ -4090,7 +4133,7 @@
           <p:cNvPr id="2" name="Title 1">
             <a:extLst>
               <a:ext uri="{FF2B5EF4-FFF2-40B4-BE49-F238E27FC236}">
-                <a16:creationId xmlns:a16="http://schemas.microsoft.com/office/drawing/2014/main" id="{3E4A6795-1948-05E4-E562-AFED99BDA8EB}"/>
+                <a16:creationId xmlns:a16="http://schemas.microsoft.com/office/drawing/2014/main" id="{581E850A-7C7B-42A5-5294-7AA8006F3F71}"/>
               </a:ext>
             </a:extLst>
           </p:cNvPr>
@@ -4101,38 +4144,24 @@
             <p:ph type="title"/>
           </p:nvPr>
         </p:nvSpPr>
-        <p:spPr>
-          <a:xfrm>
-            <a:off x="165093" y="365124"/>
-            <a:ext cx="2802278" cy="3063875"/>
-          </a:xfrm>
-        </p:spPr>
-        <p:txBody>
-          <a:bodyPr>
-            <a:normAutofit fontScale="90000"/>
-          </a:bodyPr>
-          <a:lstStyle/>
-          <a:p>
-            <a:r>
-              <a:rPr lang="en-US" sz="3200" dirty="0"/>
-              <a:t>Int1 water step</a:t>
-            </a:r>
-            <a:br>
-              <a:rPr lang="en-US" sz="3200" dirty="0"/>
-            </a:br>
-            <a:r>
-              <a:rPr lang="en-US" sz="3200" dirty="0"/>
-              <a:t>--linear time trend and TWW difference remain in step model (as expected here)</a:t>
+        <p:spPr/>
+        <p:txBody>
+          <a:bodyPr/>
+          <a:lstStyle/>
+          <a:p>
+            <a:r>
+              <a:rPr lang="en-US" dirty="0"/>
+              <a:t>Water Data</a:t>
             </a:r>
           </a:p>
         </p:txBody>
       </p:sp>
       <p:pic>
         <p:nvPicPr>
-          <p:cNvPr id="4" name="Picture 3">
-            <a:extLst>
-              <a:ext uri="{FF2B5EF4-FFF2-40B4-BE49-F238E27FC236}">
-                <a16:creationId xmlns:a16="http://schemas.microsoft.com/office/drawing/2014/main" id="{008CCC78-2D60-36A1-1E80-03F85298B888}"/>
+          <p:cNvPr id="5" name="Picture 4">
+            <a:extLst>
+              <a:ext uri="{FF2B5EF4-FFF2-40B4-BE49-F238E27FC236}">
+                <a16:creationId xmlns:a16="http://schemas.microsoft.com/office/drawing/2014/main" id="{0F04D610-142D-DA6C-F1BB-33C1CBF02886}"/>
               </a:ext>
             </a:extLst>
           </p:cNvPr>
@@ -4149,8 +4178,8 @@
         </p:blipFill>
         <p:spPr>
           <a:xfrm>
-            <a:off x="3387585" y="902683"/>
-            <a:ext cx="7864813" cy="4287384"/>
+            <a:off x="4595201" y="108079"/>
+            <a:ext cx="4430266" cy="6384796"/>
           </a:xfrm>
           <a:prstGeom prst="rect">
             <a:avLst/>
@@ -4160,7 +4189,7 @@
     </p:spTree>
     <p:extLst>
       <p:ext uri="{BB962C8B-B14F-4D97-AF65-F5344CB8AC3E}">
-        <p14:creationId xmlns:p14="http://schemas.microsoft.com/office/powerpoint/2010/main" val="58590973"/>
+        <p14:creationId xmlns:p14="http://schemas.microsoft.com/office/powerpoint/2010/main" val="1295834067"/>
       </p:ext>
     </p:extLst>
   </p:cSld>
@@ -4187,65 +4216,12 @@
           <a:chExt cx="0" cy="0"/>
         </a:xfrm>
       </p:grpSpPr>
-      <p:sp>
-        <p:nvSpPr>
-          <p:cNvPr id="2" name="Title 1">
-            <a:extLst>
-              <a:ext uri="{FF2B5EF4-FFF2-40B4-BE49-F238E27FC236}">
-                <a16:creationId xmlns:a16="http://schemas.microsoft.com/office/drawing/2014/main" id="{3E4A6795-1948-05E4-E562-AFED99BDA8EB}"/>
-              </a:ext>
-            </a:extLst>
-          </p:cNvPr>
-          <p:cNvSpPr>
-            <a:spLocks noGrp="1"/>
-          </p:cNvSpPr>
-          <p:nvPr>
-            <p:ph type="title"/>
-          </p:nvPr>
-        </p:nvSpPr>
-        <p:spPr>
-          <a:xfrm>
-            <a:off x="165093" y="365124"/>
-            <a:ext cx="2802278" cy="3063875"/>
-          </a:xfrm>
-        </p:spPr>
-        <p:txBody>
-          <a:bodyPr>
-            <a:normAutofit fontScale="90000"/>
-          </a:bodyPr>
-          <a:lstStyle/>
-          <a:p>
-            <a:r>
-              <a:rPr lang="en-US" sz="3200" dirty="0"/>
-              <a:t>Sul1 water full </a:t>
-            </a:r>
-            <a:r>
-              <a:rPr lang="en-US" sz="3200" dirty="0" err="1"/>
-              <a:t>glm</a:t>
-            </a:r>
-            <a:br>
-              <a:rPr lang="en-US" sz="3200" dirty="0"/>
-            </a:br>
-            <a:r>
-              <a:rPr lang="en-US" sz="3200" dirty="0"/>
-              <a:t>--time trend present</a:t>
-            </a:r>
-            <a:br>
-              <a:rPr lang="en-US" sz="3200" dirty="0"/>
-            </a:br>
-            <a:r>
-              <a:rPr lang="en-US" sz="3200" dirty="0"/>
-              <a:t>TWW difference versus RW(Con)</a:t>
-            </a:r>
-          </a:p>
-        </p:txBody>
-      </p:sp>
       <p:pic>
         <p:nvPicPr>
           <p:cNvPr id="5" name="Picture 4">
             <a:extLst>
               <a:ext uri="{FF2B5EF4-FFF2-40B4-BE49-F238E27FC236}">
-                <a16:creationId xmlns:a16="http://schemas.microsoft.com/office/drawing/2014/main" id="{55B5E247-739C-AD37-643E-41F0053C9FB8}"/>
+                <a16:creationId xmlns:a16="http://schemas.microsoft.com/office/drawing/2014/main" id="{C89A8D0F-4785-793E-5F59-940560DDD98D}"/>
               </a:ext>
             </a:extLst>
           </p:cNvPr>
@@ -4262,18 +4238,55 @@
         </p:blipFill>
         <p:spPr>
           <a:xfrm>
-            <a:off x="3306105" y="455537"/>
-            <a:ext cx="8803342" cy="5123996"/>
+            <a:off x="3249768" y="1086678"/>
+            <a:ext cx="8472672" cy="5571747"/>
           </a:xfrm>
           <a:prstGeom prst="rect">
             <a:avLst/>
           </a:prstGeom>
         </p:spPr>
       </p:pic>
+      <p:sp>
+        <p:nvSpPr>
+          <p:cNvPr id="2" name="Title 1">
+            <a:extLst>
+              <a:ext uri="{FF2B5EF4-FFF2-40B4-BE49-F238E27FC236}">
+                <a16:creationId xmlns:a16="http://schemas.microsoft.com/office/drawing/2014/main" id="{9C84FB5B-3548-57AF-0BDE-3735ECDD4D50}"/>
+              </a:ext>
+            </a:extLst>
+          </p:cNvPr>
+          <p:cNvSpPr>
+            <a:spLocks noGrp="1"/>
+          </p:cNvSpPr>
+          <p:nvPr>
+            <p:ph type="title"/>
+          </p:nvPr>
+        </p:nvSpPr>
+        <p:spPr>
+          <a:xfrm>
+            <a:off x="0" y="0"/>
+            <a:ext cx="4664765" cy="1603513"/>
+          </a:xfrm>
+        </p:spPr>
+        <p:txBody>
+          <a:bodyPr/>
+          <a:lstStyle/>
+          <a:p>
+            <a:r>
+              <a:rPr lang="en-US" dirty="0" err="1"/>
+              <a:t>S_maltophilia</a:t>
+            </a:r>
+            <a:r>
+              <a:rPr lang="en-US" dirty="0"/>
+              <a:t> data transformation</a:t>
+            </a:r>
+          </a:p>
+        </p:txBody>
+      </p:sp>
     </p:spTree>
     <p:extLst>
       <p:ext uri="{BB962C8B-B14F-4D97-AF65-F5344CB8AC3E}">
-        <p14:creationId xmlns:p14="http://schemas.microsoft.com/office/powerpoint/2010/main" val="3345586831"/>
+        <p14:creationId xmlns:p14="http://schemas.microsoft.com/office/powerpoint/2010/main" val="2425370377"/>
       </p:ext>
     </p:extLst>
   </p:cSld>
@@ -4324,13 +4337,21 @@
         </p:spPr>
         <p:txBody>
           <a:bodyPr>
-            <a:normAutofit/>
+            <a:normAutofit fontScale="90000"/>
           </a:bodyPr>
           <a:lstStyle/>
           <a:p>
             <a:r>
               <a:rPr lang="en-US" sz="3200" dirty="0"/>
-              <a:t>Sul1 water full </a:t>
+              <a:t>S </a:t>
+            </a:r>
+            <a:r>
+              <a:rPr lang="en-US" sz="3200" dirty="0" err="1"/>
+              <a:t>maltophilia</a:t>
+            </a:r>
+            <a:r>
+              <a:rPr lang="en-US" sz="3200" dirty="0"/>
+              <a:t> water full </a:t>
             </a:r>
             <a:r>
               <a:rPr lang="en-US" sz="3200" dirty="0" err="1"/>
@@ -4341,17 +4362,17 @@
             </a:br>
             <a:r>
               <a:rPr lang="en-US" sz="3200" dirty="0"/>
-              <a:t>--time trend and TWW difference remain</a:t>
+              <a:t>--there does seem to be a linear/quadratic trend over time here</a:t>
             </a:r>
           </a:p>
         </p:txBody>
       </p:sp>
       <p:pic>
         <p:nvPicPr>
-          <p:cNvPr id="4" name="Picture 3">
-            <a:extLst>
-              <a:ext uri="{FF2B5EF4-FFF2-40B4-BE49-F238E27FC236}">
-                <a16:creationId xmlns:a16="http://schemas.microsoft.com/office/drawing/2014/main" id="{57A0B7CD-0918-0D36-A450-87E07F719F3F}"/>
+          <p:cNvPr id="8" name="Picture 7">
+            <a:extLst>
+              <a:ext uri="{FF2B5EF4-FFF2-40B4-BE49-F238E27FC236}">
+                <a16:creationId xmlns:a16="http://schemas.microsoft.com/office/drawing/2014/main" id="{045CB1C0-171D-431C-03FE-681274DEDD20}"/>
               </a:ext>
             </a:extLst>
           </p:cNvPr>
@@ -4368,8 +4389,8 @@
         </p:blipFill>
         <p:spPr>
           <a:xfrm>
-            <a:off x="3495548" y="365123"/>
-            <a:ext cx="8206595" cy="5747809"/>
+            <a:off x="3400282" y="628573"/>
+            <a:ext cx="8561318" cy="4569959"/>
           </a:xfrm>
           <a:prstGeom prst="rect">
             <a:avLst/>
@@ -4379,7 +4400,7 @@
     </p:spTree>
     <p:extLst>
       <p:ext uri="{BB962C8B-B14F-4D97-AF65-F5344CB8AC3E}">
-        <p14:creationId xmlns:p14="http://schemas.microsoft.com/office/powerpoint/2010/main" val="242479201"/>
+        <p14:creationId xmlns:p14="http://schemas.microsoft.com/office/powerpoint/2010/main" val="876230889"/>
       </p:ext>
     </p:extLst>
   </p:cSld>
@@ -4430,34 +4451,42 @@
         </p:spPr>
         <p:txBody>
           <a:bodyPr>
-            <a:normAutofit/>
+            <a:normAutofit fontScale="90000"/>
           </a:bodyPr>
           <a:lstStyle/>
           <a:p>
             <a:r>
               <a:rPr lang="en-US" sz="3200" dirty="0"/>
-              <a:t>P. aeruginosa water full </a:t>
+              <a:t>S </a:t>
             </a:r>
             <a:r>
               <a:rPr lang="en-US" sz="3200" dirty="0" err="1"/>
-              <a:t>glm</a:t>
+              <a:t>maltophilia</a:t>
+            </a:r>
+            <a:r>
+              <a:rPr lang="en-US" sz="3200" dirty="0"/>
+              <a:t> water step</a:t>
             </a:r>
             <a:br>
               <a:rPr lang="en-US" sz="3200" dirty="0"/>
             </a:br>
             <a:r>
               <a:rPr lang="en-US" sz="3200" dirty="0"/>
-              <a:t>-nothing significant</a:t>
-            </a:r>
+              <a:t>--time trend remains for step() implementation</a:t>
+            </a:r>
+            <a:br>
+              <a:rPr lang="en-US" sz="3200" dirty="0"/>
+            </a:br>
+            <a:endParaRPr lang="en-US" sz="3200" dirty="0"/>
           </a:p>
         </p:txBody>
       </p:sp>
       <p:pic>
         <p:nvPicPr>
-          <p:cNvPr id="5" name="Picture 4">
-            <a:extLst>
-              <a:ext uri="{FF2B5EF4-FFF2-40B4-BE49-F238E27FC236}">
-                <a16:creationId xmlns:a16="http://schemas.microsoft.com/office/drawing/2014/main" id="{196C53B4-D1B6-15E1-D3AF-41F9C3B583E9}"/>
+          <p:cNvPr id="6" name="Picture 5">
+            <a:extLst>
+              <a:ext uri="{FF2B5EF4-FFF2-40B4-BE49-F238E27FC236}">
+                <a16:creationId xmlns:a16="http://schemas.microsoft.com/office/drawing/2014/main" id="{F0D4CAA0-037E-E805-B857-22DCB63BAFF1}"/>
               </a:ext>
             </a:extLst>
           </p:cNvPr>
@@ -4474,8 +4503,8 @@
         </p:blipFill>
         <p:spPr>
           <a:xfrm>
-            <a:off x="3271171" y="605291"/>
-            <a:ext cx="8535504" cy="4635575"/>
+            <a:off x="3245779" y="411084"/>
+            <a:ext cx="8845529" cy="5286983"/>
           </a:xfrm>
           <a:prstGeom prst="rect">
             <a:avLst/>
@@ -4485,7 +4514,7 @@
     </p:spTree>
     <p:extLst>
       <p:ext uri="{BB962C8B-B14F-4D97-AF65-F5344CB8AC3E}">
-        <p14:creationId xmlns:p14="http://schemas.microsoft.com/office/powerpoint/2010/main" val="1203665239"/>
+        <p14:creationId xmlns:p14="http://schemas.microsoft.com/office/powerpoint/2010/main" val="1805507326"/>
       </p:ext>
     </p:extLst>
   </p:cSld>
@@ -4512,54 +4541,12 @@
           <a:chExt cx="0" cy="0"/>
         </a:xfrm>
       </p:grpSpPr>
-      <p:sp>
-        <p:nvSpPr>
-          <p:cNvPr id="2" name="Title 1">
-            <a:extLst>
-              <a:ext uri="{FF2B5EF4-FFF2-40B4-BE49-F238E27FC236}">
-                <a16:creationId xmlns:a16="http://schemas.microsoft.com/office/drawing/2014/main" id="{3E4A6795-1948-05E4-E562-AFED99BDA8EB}"/>
-              </a:ext>
-            </a:extLst>
-          </p:cNvPr>
-          <p:cNvSpPr>
-            <a:spLocks noGrp="1"/>
-          </p:cNvSpPr>
-          <p:nvPr>
-            <p:ph type="title"/>
-          </p:nvPr>
-        </p:nvSpPr>
-        <p:spPr>
-          <a:xfrm>
-            <a:off x="165093" y="365124"/>
-            <a:ext cx="2802278" cy="3063875"/>
-          </a:xfrm>
-        </p:spPr>
-        <p:txBody>
-          <a:bodyPr>
-            <a:normAutofit/>
-          </a:bodyPr>
-          <a:lstStyle/>
-          <a:p>
-            <a:r>
-              <a:rPr lang="en-US" sz="3200" dirty="0"/>
-              <a:t>P. aeruginosa water step</a:t>
-            </a:r>
-            <a:br>
-              <a:rPr lang="en-US" sz="3200" dirty="0"/>
-            </a:br>
-            <a:r>
-              <a:rPr lang="en-US" sz="3200" dirty="0"/>
-              <a:t>-still nothing significant</a:t>
-            </a:r>
-          </a:p>
-        </p:txBody>
-      </p:sp>
       <p:pic>
         <p:nvPicPr>
-          <p:cNvPr id="4" name="Picture 3">
-            <a:extLst>
-              <a:ext uri="{FF2B5EF4-FFF2-40B4-BE49-F238E27FC236}">
-                <a16:creationId xmlns:a16="http://schemas.microsoft.com/office/drawing/2014/main" id="{EE579431-4984-DD87-CD21-D8A00CC57FFB}"/>
+          <p:cNvPr id="5" name="Picture 4">
+            <a:extLst>
+              <a:ext uri="{FF2B5EF4-FFF2-40B4-BE49-F238E27FC236}">
+                <a16:creationId xmlns:a16="http://schemas.microsoft.com/office/drawing/2014/main" id="{C89A8D0F-4785-793E-5F59-940560DDD98D}"/>
               </a:ext>
             </a:extLst>
           </p:cNvPr>
@@ -4576,18 +4563,55 @@
         </p:blipFill>
         <p:spPr>
           <a:xfrm>
-            <a:off x="3711452" y="990474"/>
-            <a:ext cx="8461645" cy="4326593"/>
+            <a:off x="3249768" y="1086678"/>
+            <a:ext cx="8472672" cy="5571747"/>
           </a:xfrm>
           <a:prstGeom prst="rect">
             <a:avLst/>
           </a:prstGeom>
         </p:spPr>
       </p:pic>
+      <p:sp>
+        <p:nvSpPr>
+          <p:cNvPr id="2" name="Title 1">
+            <a:extLst>
+              <a:ext uri="{FF2B5EF4-FFF2-40B4-BE49-F238E27FC236}">
+                <a16:creationId xmlns:a16="http://schemas.microsoft.com/office/drawing/2014/main" id="{9C84FB5B-3548-57AF-0BDE-3735ECDD4D50}"/>
+              </a:ext>
+            </a:extLst>
+          </p:cNvPr>
+          <p:cNvSpPr>
+            <a:spLocks noGrp="1"/>
+          </p:cNvSpPr>
+          <p:nvPr>
+            <p:ph type="title"/>
+          </p:nvPr>
+        </p:nvSpPr>
+        <p:spPr>
+          <a:xfrm>
+            <a:off x="0" y="0"/>
+            <a:ext cx="4664765" cy="1603513"/>
+          </a:xfrm>
+        </p:spPr>
+        <p:txBody>
+          <a:bodyPr/>
+          <a:lstStyle/>
+          <a:p>
+            <a:r>
+              <a:rPr lang="en-US" dirty="0" err="1"/>
+              <a:t>S_maltophilia</a:t>
+            </a:r>
+            <a:r>
+              <a:rPr lang="en-US" dirty="0"/>
+              <a:t> data transformation</a:t>
+            </a:r>
+          </a:p>
+        </p:txBody>
+      </p:sp>
     </p:spTree>
     <p:extLst>
       <p:ext uri="{BB962C8B-B14F-4D97-AF65-F5344CB8AC3E}">
-        <p14:creationId xmlns:p14="http://schemas.microsoft.com/office/powerpoint/2010/main" val="866700415"/>
+        <p14:creationId xmlns:p14="http://schemas.microsoft.com/office/powerpoint/2010/main" val="398696649"/>
       </p:ext>
     </p:extLst>
   </p:cSld>
@@ -4712,6 +4736,842 @@
           <p:cNvPr id="2" name="Title 1">
             <a:extLst>
               <a:ext uri="{FF2B5EF4-FFF2-40B4-BE49-F238E27FC236}">
+                <a16:creationId xmlns:a16="http://schemas.microsoft.com/office/drawing/2014/main" id="{3E4A6795-1948-05E4-E562-AFED99BDA8EB}"/>
+              </a:ext>
+            </a:extLst>
+          </p:cNvPr>
+          <p:cNvSpPr>
+            <a:spLocks noGrp="1"/>
+          </p:cNvSpPr>
+          <p:nvPr>
+            <p:ph type="title"/>
+          </p:nvPr>
+        </p:nvSpPr>
+        <p:spPr>
+          <a:xfrm>
+            <a:off x="309026" y="1118658"/>
+            <a:ext cx="2802278" cy="3063875"/>
+          </a:xfrm>
+        </p:spPr>
+        <p:txBody>
+          <a:bodyPr>
+            <a:normAutofit fontScale="90000"/>
+          </a:bodyPr>
+          <a:lstStyle/>
+          <a:p>
+            <a:r>
+              <a:rPr lang="en-US" sz="3200" dirty="0"/>
+              <a:t>Int1 water full </a:t>
+            </a:r>
+            <a:r>
+              <a:rPr lang="en-US" sz="3200" dirty="0" err="1"/>
+              <a:t>glm</a:t>
+            </a:r>
+            <a:br>
+              <a:rPr lang="en-US" sz="3200" dirty="0"/>
+            </a:br>
+            <a:r>
+              <a:rPr lang="en-US" sz="3200" dirty="0"/>
+              <a:t>--TWW significant vs river water</a:t>
+            </a:r>
+            <a:br>
+              <a:rPr lang="en-US" sz="3200" dirty="0"/>
+            </a:br>
+            <a:r>
+              <a:rPr lang="en-US" sz="3200" dirty="0"/>
+              <a:t>--linear time trend also present</a:t>
+            </a:r>
+          </a:p>
+        </p:txBody>
+      </p:sp>
+      <p:pic>
+        <p:nvPicPr>
+          <p:cNvPr id="5" name="Picture 4">
+            <a:extLst>
+              <a:ext uri="{FF2B5EF4-FFF2-40B4-BE49-F238E27FC236}">
+                <a16:creationId xmlns:a16="http://schemas.microsoft.com/office/drawing/2014/main" id="{CAF85615-64CF-0402-2140-27C4142A795D}"/>
+              </a:ext>
+            </a:extLst>
+          </p:cNvPr>
+          <p:cNvPicPr>
+            <a:picLocks noChangeAspect="1"/>
+          </p:cNvPicPr>
+          <p:nvPr/>
+        </p:nvPicPr>
+        <p:blipFill>
+          <a:blip r:embed="rId2"/>
+          <a:stretch>
+            <a:fillRect/>
+          </a:stretch>
+        </p:blipFill>
+        <p:spPr>
+          <a:xfrm>
+            <a:off x="3597146" y="365124"/>
+            <a:ext cx="8594101" cy="5045076"/>
+          </a:xfrm>
+          <a:prstGeom prst="rect">
+            <a:avLst/>
+          </a:prstGeom>
+        </p:spPr>
+      </p:pic>
+    </p:spTree>
+    <p:extLst>
+      <p:ext uri="{BB962C8B-B14F-4D97-AF65-F5344CB8AC3E}">
+        <p14:creationId xmlns:p14="http://schemas.microsoft.com/office/powerpoint/2010/main" val="1042782054"/>
+      </p:ext>
+    </p:extLst>
+  </p:cSld>
+  <p:clrMapOvr>
+    <a:masterClrMapping/>
+  </p:clrMapOvr>
+</p:sld>
+</file>
+
+<file path=ppt/slides/slide21.xml><?xml version="1.0" encoding="utf-8"?>
+<p:sld xmlns:a="http://schemas.openxmlformats.org/drawingml/2006/main" xmlns:r="http://schemas.openxmlformats.org/officeDocument/2006/relationships" xmlns:p="http://schemas.openxmlformats.org/presentationml/2006/main">
+  <p:cSld>
+    <p:spTree>
+      <p:nvGrpSpPr>
+        <p:cNvPr id="1" name=""/>
+        <p:cNvGrpSpPr/>
+        <p:nvPr/>
+      </p:nvGrpSpPr>
+      <p:grpSpPr>
+        <a:xfrm>
+          <a:off x="0" y="0"/>
+          <a:ext cx="0" cy="0"/>
+          <a:chOff x="0" y="0"/>
+          <a:chExt cx="0" cy="0"/>
+        </a:xfrm>
+      </p:grpSpPr>
+      <p:sp>
+        <p:nvSpPr>
+          <p:cNvPr id="2" name="Title 1">
+            <a:extLst>
+              <a:ext uri="{FF2B5EF4-FFF2-40B4-BE49-F238E27FC236}">
+                <a16:creationId xmlns:a16="http://schemas.microsoft.com/office/drawing/2014/main" id="{3E4A6795-1948-05E4-E562-AFED99BDA8EB}"/>
+              </a:ext>
+            </a:extLst>
+          </p:cNvPr>
+          <p:cNvSpPr>
+            <a:spLocks noGrp="1"/>
+          </p:cNvSpPr>
+          <p:nvPr>
+            <p:ph type="title"/>
+          </p:nvPr>
+        </p:nvSpPr>
+        <p:spPr>
+          <a:xfrm>
+            <a:off x="165093" y="365124"/>
+            <a:ext cx="2802278" cy="3063875"/>
+          </a:xfrm>
+        </p:spPr>
+        <p:txBody>
+          <a:bodyPr>
+            <a:normAutofit fontScale="90000"/>
+          </a:bodyPr>
+          <a:lstStyle/>
+          <a:p>
+            <a:r>
+              <a:rPr lang="en-US" sz="3200" dirty="0"/>
+              <a:t>Int1 water step</a:t>
+            </a:r>
+            <a:br>
+              <a:rPr lang="en-US" sz="3200" dirty="0"/>
+            </a:br>
+            <a:r>
+              <a:rPr lang="en-US" sz="3200" dirty="0"/>
+              <a:t>--linear time trend and TWW difference remain in step model (as expected here)</a:t>
+            </a:r>
+          </a:p>
+        </p:txBody>
+      </p:sp>
+      <p:pic>
+        <p:nvPicPr>
+          <p:cNvPr id="4" name="Picture 3">
+            <a:extLst>
+              <a:ext uri="{FF2B5EF4-FFF2-40B4-BE49-F238E27FC236}">
+                <a16:creationId xmlns:a16="http://schemas.microsoft.com/office/drawing/2014/main" id="{008CCC78-2D60-36A1-1E80-03F85298B888}"/>
+              </a:ext>
+            </a:extLst>
+          </p:cNvPr>
+          <p:cNvPicPr>
+            <a:picLocks noChangeAspect="1"/>
+          </p:cNvPicPr>
+          <p:nvPr/>
+        </p:nvPicPr>
+        <p:blipFill>
+          <a:blip r:embed="rId2"/>
+          <a:stretch>
+            <a:fillRect/>
+          </a:stretch>
+        </p:blipFill>
+        <p:spPr>
+          <a:xfrm>
+            <a:off x="3387585" y="902683"/>
+            <a:ext cx="7864813" cy="4287384"/>
+          </a:xfrm>
+          <a:prstGeom prst="rect">
+            <a:avLst/>
+          </a:prstGeom>
+        </p:spPr>
+      </p:pic>
+    </p:spTree>
+    <p:extLst>
+      <p:ext uri="{BB962C8B-B14F-4D97-AF65-F5344CB8AC3E}">
+        <p14:creationId xmlns:p14="http://schemas.microsoft.com/office/powerpoint/2010/main" val="58590973"/>
+      </p:ext>
+    </p:extLst>
+  </p:cSld>
+  <p:clrMapOvr>
+    <a:masterClrMapping/>
+  </p:clrMapOvr>
+</p:sld>
+</file>
+
+<file path=ppt/slides/slide22.xml><?xml version="1.0" encoding="utf-8"?>
+<p:sld xmlns:a="http://schemas.openxmlformats.org/drawingml/2006/main" xmlns:r="http://schemas.openxmlformats.org/officeDocument/2006/relationships" xmlns:p="http://schemas.openxmlformats.org/presentationml/2006/main">
+  <p:cSld>
+    <p:spTree>
+      <p:nvGrpSpPr>
+        <p:cNvPr id="1" name=""/>
+        <p:cNvGrpSpPr/>
+        <p:nvPr/>
+      </p:nvGrpSpPr>
+      <p:grpSpPr>
+        <a:xfrm>
+          <a:off x="0" y="0"/>
+          <a:ext cx="0" cy="0"/>
+          <a:chOff x="0" y="0"/>
+          <a:chExt cx="0" cy="0"/>
+        </a:xfrm>
+      </p:grpSpPr>
+      <p:pic>
+        <p:nvPicPr>
+          <p:cNvPr id="5" name="Picture 4">
+            <a:extLst>
+              <a:ext uri="{FF2B5EF4-FFF2-40B4-BE49-F238E27FC236}">
+                <a16:creationId xmlns:a16="http://schemas.microsoft.com/office/drawing/2014/main" id="{C89A8D0F-4785-793E-5F59-940560DDD98D}"/>
+              </a:ext>
+            </a:extLst>
+          </p:cNvPr>
+          <p:cNvPicPr>
+            <a:picLocks noChangeAspect="1"/>
+          </p:cNvPicPr>
+          <p:nvPr/>
+        </p:nvPicPr>
+        <p:blipFill>
+          <a:blip r:embed="rId2"/>
+          <a:stretch>
+            <a:fillRect/>
+          </a:stretch>
+        </p:blipFill>
+        <p:spPr>
+          <a:xfrm>
+            <a:off x="3249768" y="1086678"/>
+            <a:ext cx="8472672" cy="5571747"/>
+          </a:xfrm>
+          <a:prstGeom prst="rect">
+            <a:avLst/>
+          </a:prstGeom>
+        </p:spPr>
+      </p:pic>
+      <p:sp>
+        <p:nvSpPr>
+          <p:cNvPr id="2" name="Title 1">
+            <a:extLst>
+              <a:ext uri="{FF2B5EF4-FFF2-40B4-BE49-F238E27FC236}">
+                <a16:creationId xmlns:a16="http://schemas.microsoft.com/office/drawing/2014/main" id="{9C84FB5B-3548-57AF-0BDE-3735ECDD4D50}"/>
+              </a:ext>
+            </a:extLst>
+          </p:cNvPr>
+          <p:cNvSpPr>
+            <a:spLocks noGrp="1"/>
+          </p:cNvSpPr>
+          <p:nvPr>
+            <p:ph type="title"/>
+          </p:nvPr>
+        </p:nvSpPr>
+        <p:spPr>
+          <a:xfrm>
+            <a:off x="0" y="0"/>
+            <a:ext cx="4664765" cy="1603513"/>
+          </a:xfrm>
+        </p:spPr>
+        <p:txBody>
+          <a:bodyPr/>
+          <a:lstStyle/>
+          <a:p>
+            <a:r>
+              <a:rPr lang="en-US" dirty="0" err="1"/>
+              <a:t>S_maltophilia</a:t>
+            </a:r>
+            <a:r>
+              <a:rPr lang="en-US" dirty="0"/>
+              <a:t> data transformation</a:t>
+            </a:r>
+          </a:p>
+        </p:txBody>
+      </p:sp>
+    </p:spTree>
+    <p:extLst>
+      <p:ext uri="{BB962C8B-B14F-4D97-AF65-F5344CB8AC3E}">
+        <p14:creationId xmlns:p14="http://schemas.microsoft.com/office/powerpoint/2010/main" val="1208020300"/>
+      </p:ext>
+    </p:extLst>
+  </p:cSld>
+  <p:clrMapOvr>
+    <a:masterClrMapping/>
+  </p:clrMapOvr>
+</p:sld>
+</file>
+
+<file path=ppt/slides/slide23.xml><?xml version="1.0" encoding="utf-8"?>
+<p:sld xmlns:a="http://schemas.openxmlformats.org/drawingml/2006/main" xmlns:r="http://schemas.openxmlformats.org/officeDocument/2006/relationships" xmlns:p="http://schemas.openxmlformats.org/presentationml/2006/main">
+  <p:cSld>
+    <p:spTree>
+      <p:nvGrpSpPr>
+        <p:cNvPr id="1" name=""/>
+        <p:cNvGrpSpPr/>
+        <p:nvPr/>
+      </p:nvGrpSpPr>
+      <p:grpSpPr>
+        <a:xfrm>
+          <a:off x="0" y="0"/>
+          <a:ext cx="0" cy="0"/>
+          <a:chOff x="0" y="0"/>
+          <a:chExt cx="0" cy="0"/>
+        </a:xfrm>
+      </p:grpSpPr>
+      <p:sp>
+        <p:nvSpPr>
+          <p:cNvPr id="2" name="Title 1">
+            <a:extLst>
+              <a:ext uri="{FF2B5EF4-FFF2-40B4-BE49-F238E27FC236}">
+                <a16:creationId xmlns:a16="http://schemas.microsoft.com/office/drawing/2014/main" id="{3E4A6795-1948-05E4-E562-AFED99BDA8EB}"/>
+              </a:ext>
+            </a:extLst>
+          </p:cNvPr>
+          <p:cNvSpPr>
+            <a:spLocks noGrp="1"/>
+          </p:cNvSpPr>
+          <p:nvPr>
+            <p:ph type="title"/>
+          </p:nvPr>
+        </p:nvSpPr>
+        <p:spPr>
+          <a:xfrm>
+            <a:off x="165093" y="365124"/>
+            <a:ext cx="2802278" cy="3063875"/>
+          </a:xfrm>
+        </p:spPr>
+        <p:txBody>
+          <a:bodyPr>
+            <a:normAutofit fontScale="90000"/>
+          </a:bodyPr>
+          <a:lstStyle/>
+          <a:p>
+            <a:r>
+              <a:rPr lang="en-US" sz="3200" dirty="0"/>
+              <a:t>Sul1 water full </a:t>
+            </a:r>
+            <a:r>
+              <a:rPr lang="en-US" sz="3200" dirty="0" err="1"/>
+              <a:t>glm</a:t>
+            </a:r>
+            <a:br>
+              <a:rPr lang="en-US" sz="3200" dirty="0"/>
+            </a:br>
+            <a:r>
+              <a:rPr lang="en-US" sz="3200" dirty="0"/>
+              <a:t>--time trend present</a:t>
+            </a:r>
+            <a:br>
+              <a:rPr lang="en-US" sz="3200" dirty="0"/>
+            </a:br>
+            <a:r>
+              <a:rPr lang="en-US" sz="3200" dirty="0"/>
+              <a:t>TWW difference versus RW(Con)</a:t>
+            </a:r>
+          </a:p>
+        </p:txBody>
+      </p:sp>
+      <p:pic>
+        <p:nvPicPr>
+          <p:cNvPr id="5" name="Picture 4">
+            <a:extLst>
+              <a:ext uri="{FF2B5EF4-FFF2-40B4-BE49-F238E27FC236}">
+                <a16:creationId xmlns:a16="http://schemas.microsoft.com/office/drawing/2014/main" id="{55B5E247-739C-AD37-643E-41F0053C9FB8}"/>
+              </a:ext>
+            </a:extLst>
+          </p:cNvPr>
+          <p:cNvPicPr>
+            <a:picLocks noChangeAspect="1"/>
+          </p:cNvPicPr>
+          <p:nvPr/>
+        </p:nvPicPr>
+        <p:blipFill>
+          <a:blip r:embed="rId2"/>
+          <a:stretch>
+            <a:fillRect/>
+          </a:stretch>
+        </p:blipFill>
+        <p:spPr>
+          <a:xfrm>
+            <a:off x="3306105" y="455537"/>
+            <a:ext cx="8803342" cy="5123996"/>
+          </a:xfrm>
+          <a:prstGeom prst="rect">
+            <a:avLst/>
+          </a:prstGeom>
+        </p:spPr>
+      </p:pic>
+    </p:spTree>
+    <p:extLst>
+      <p:ext uri="{BB962C8B-B14F-4D97-AF65-F5344CB8AC3E}">
+        <p14:creationId xmlns:p14="http://schemas.microsoft.com/office/powerpoint/2010/main" val="3345586831"/>
+      </p:ext>
+    </p:extLst>
+  </p:cSld>
+  <p:clrMapOvr>
+    <a:masterClrMapping/>
+  </p:clrMapOvr>
+</p:sld>
+</file>
+
+<file path=ppt/slides/slide24.xml><?xml version="1.0" encoding="utf-8"?>
+<p:sld xmlns:a="http://schemas.openxmlformats.org/drawingml/2006/main" xmlns:r="http://schemas.openxmlformats.org/officeDocument/2006/relationships" xmlns:p="http://schemas.openxmlformats.org/presentationml/2006/main">
+  <p:cSld>
+    <p:spTree>
+      <p:nvGrpSpPr>
+        <p:cNvPr id="1" name=""/>
+        <p:cNvGrpSpPr/>
+        <p:nvPr/>
+      </p:nvGrpSpPr>
+      <p:grpSpPr>
+        <a:xfrm>
+          <a:off x="0" y="0"/>
+          <a:ext cx="0" cy="0"/>
+          <a:chOff x="0" y="0"/>
+          <a:chExt cx="0" cy="0"/>
+        </a:xfrm>
+      </p:grpSpPr>
+      <p:sp>
+        <p:nvSpPr>
+          <p:cNvPr id="2" name="Title 1">
+            <a:extLst>
+              <a:ext uri="{FF2B5EF4-FFF2-40B4-BE49-F238E27FC236}">
+                <a16:creationId xmlns:a16="http://schemas.microsoft.com/office/drawing/2014/main" id="{3E4A6795-1948-05E4-E562-AFED99BDA8EB}"/>
+              </a:ext>
+            </a:extLst>
+          </p:cNvPr>
+          <p:cNvSpPr>
+            <a:spLocks noGrp="1"/>
+          </p:cNvSpPr>
+          <p:nvPr>
+            <p:ph type="title"/>
+          </p:nvPr>
+        </p:nvSpPr>
+        <p:spPr>
+          <a:xfrm>
+            <a:off x="165093" y="365124"/>
+            <a:ext cx="2802278" cy="3063875"/>
+          </a:xfrm>
+        </p:spPr>
+        <p:txBody>
+          <a:bodyPr>
+            <a:normAutofit/>
+          </a:bodyPr>
+          <a:lstStyle/>
+          <a:p>
+            <a:r>
+              <a:rPr lang="en-US" sz="3200" dirty="0"/>
+              <a:t>Sul1 water full </a:t>
+            </a:r>
+            <a:r>
+              <a:rPr lang="en-US" sz="3200" dirty="0" err="1"/>
+              <a:t>glm</a:t>
+            </a:r>
+            <a:br>
+              <a:rPr lang="en-US" sz="3200" dirty="0"/>
+            </a:br>
+            <a:r>
+              <a:rPr lang="en-US" sz="3200" dirty="0"/>
+              <a:t>--time trend and TWW difference remain</a:t>
+            </a:r>
+          </a:p>
+        </p:txBody>
+      </p:sp>
+      <p:pic>
+        <p:nvPicPr>
+          <p:cNvPr id="4" name="Picture 3">
+            <a:extLst>
+              <a:ext uri="{FF2B5EF4-FFF2-40B4-BE49-F238E27FC236}">
+                <a16:creationId xmlns:a16="http://schemas.microsoft.com/office/drawing/2014/main" id="{57A0B7CD-0918-0D36-A450-87E07F719F3F}"/>
+              </a:ext>
+            </a:extLst>
+          </p:cNvPr>
+          <p:cNvPicPr>
+            <a:picLocks noChangeAspect="1"/>
+          </p:cNvPicPr>
+          <p:nvPr/>
+        </p:nvPicPr>
+        <p:blipFill>
+          <a:blip r:embed="rId2"/>
+          <a:stretch>
+            <a:fillRect/>
+          </a:stretch>
+        </p:blipFill>
+        <p:spPr>
+          <a:xfrm>
+            <a:off x="3495548" y="365123"/>
+            <a:ext cx="8206595" cy="5747809"/>
+          </a:xfrm>
+          <a:prstGeom prst="rect">
+            <a:avLst/>
+          </a:prstGeom>
+        </p:spPr>
+      </p:pic>
+    </p:spTree>
+    <p:extLst>
+      <p:ext uri="{BB962C8B-B14F-4D97-AF65-F5344CB8AC3E}">
+        <p14:creationId xmlns:p14="http://schemas.microsoft.com/office/powerpoint/2010/main" val="242479201"/>
+      </p:ext>
+    </p:extLst>
+  </p:cSld>
+  <p:clrMapOvr>
+    <a:masterClrMapping/>
+  </p:clrMapOvr>
+</p:sld>
+</file>
+
+<file path=ppt/slides/slide25.xml><?xml version="1.0" encoding="utf-8"?>
+<p:sld xmlns:a="http://schemas.openxmlformats.org/drawingml/2006/main" xmlns:r="http://schemas.openxmlformats.org/officeDocument/2006/relationships" xmlns:p="http://schemas.openxmlformats.org/presentationml/2006/main">
+  <p:cSld>
+    <p:spTree>
+      <p:nvGrpSpPr>
+        <p:cNvPr id="1" name=""/>
+        <p:cNvGrpSpPr/>
+        <p:nvPr/>
+      </p:nvGrpSpPr>
+      <p:grpSpPr>
+        <a:xfrm>
+          <a:off x="0" y="0"/>
+          <a:ext cx="0" cy="0"/>
+          <a:chOff x="0" y="0"/>
+          <a:chExt cx="0" cy="0"/>
+        </a:xfrm>
+      </p:grpSpPr>
+      <p:pic>
+        <p:nvPicPr>
+          <p:cNvPr id="5" name="Picture 4">
+            <a:extLst>
+              <a:ext uri="{FF2B5EF4-FFF2-40B4-BE49-F238E27FC236}">
+                <a16:creationId xmlns:a16="http://schemas.microsoft.com/office/drawing/2014/main" id="{C89A8D0F-4785-793E-5F59-940560DDD98D}"/>
+              </a:ext>
+            </a:extLst>
+          </p:cNvPr>
+          <p:cNvPicPr>
+            <a:picLocks noChangeAspect="1"/>
+          </p:cNvPicPr>
+          <p:nvPr/>
+        </p:nvPicPr>
+        <p:blipFill>
+          <a:blip r:embed="rId2"/>
+          <a:stretch>
+            <a:fillRect/>
+          </a:stretch>
+        </p:blipFill>
+        <p:spPr>
+          <a:xfrm>
+            <a:off x="3249768" y="1086678"/>
+            <a:ext cx="8472672" cy="5571747"/>
+          </a:xfrm>
+          <a:prstGeom prst="rect">
+            <a:avLst/>
+          </a:prstGeom>
+        </p:spPr>
+      </p:pic>
+      <p:sp>
+        <p:nvSpPr>
+          <p:cNvPr id="2" name="Title 1">
+            <a:extLst>
+              <a:ext uri="{FF2B5EF4-FFF2-40B4-BE49-F238E27FC236}">
+                <a16:creationId xmlns:a16="http://schemas.microsoft.com/office/drawing/2014/main" id="{9C84FB5B-3548-57AF-0BDE-3735ECDD4D50}"/>
+              </a:ext>
+            </a:extLst>
+          </p:cNvPr>
+          <p:cNvSpPr>
+            <a:spLocks noGrp="1"/>
+          </p:cNvSpPr>
+          <p:nvPr>
+            <p:ph type="title"/>
+          </p:nvPr>
+        </p:nvSpPr>
+        <p:spPr>
+          <a:xfrm>
+            <a:off x="0" y="0"/>
+            <a:ext cx="4664765" cy="1603513"/>
+          </a:xfrm>
+        </p:spPr>
+        <p:txBody>
+          <a:bodyPr/>
+          <a:lstStyle/>
+          <a:p>
+            <a:r>
+              <a:rPr lang="en-US" dirty="0" err="1"/>
+              <a:t>S_maltophilia</a:t>
+            </a:r>
+            <a:r>
+              <a:rPr lang="en-US" dirty="0"/>
+              <a:t> data transformation</a:t>
+            </a:r>
+          </a:p>
+        </p:txBody>
+      </p:sp>
+    </p:spTree>
+    <p:extLst>
+      <p:ext uri="{BB962C8B-B14F-4D97-AF65-F5344CB8AC3E}">
+        <p14:creationId xmlns:p14="http://schemas.microsoft.com/office/powerpoint/2010/main" val="593966935"/>
+      </p:ext>
+    </p:extLst>
+  </p:cSld>
+  <p:clrMapOvr>
+    <a:masterClrMapping/>
+  </p:clrMapOvr>
+</p:sld>
+</file>
+
+<file path=ppt/slides/slide26.xml><?xml version="1.0" encoding="utf-8"?>
+<p:sld xmlns:a="http://schemas.openxmlformats.org/drawingml/2006/main" xmlns:r="http://schemas.openxmlformats.org/officeDocument/2006/relationships" xmlns:p="http://schemas.openxmlformats.org/presentationml/2006/main">
+  <p:cSld>
+    <p:spTree>
+      <p:nvGrpSpPr>
+        <p:cNvPr id="1" name=""/>
+        <p:cNvGrpSpPr/>
+        <p:nvPr/>
+      </p:nvGrpSpPr>
+      <p:grpSpPr>
+        <a:xfrm>
+          <a:off x="0" y="0"/>
+          <a:ext cx="0" cy="0"/>
+          <a:chOff x="0" y="0"/>
+          <a:chExt cx="0" cy="0"/>
+        </a:xfrm>
+      </p:grpSpPr>
+      <p:sp>
+        <p:nvSpPr>
+          <p:cNvPr id="2" name="Title 1">
+            <a:extLst>
+              <a:ext uri="{FF2B5EF4-FFF2-40B4-BE49-F238E27FC236}">
+                <a16:creationId xmlns:a16="http://schemas.microsoft.com/office/drawing/2014/main" id="{3E4A6795-1948-05E4-E562-AFED99BDA8EB}"/>
+              </a:ext>
+            </a:extLst>
+          </p:cNvPr>
+          <p:cNvSpPr>
+            <a:spLocks noGrp="1"/>
+          </p:cNvSpPr>
+          <p:nvPr>
+            <p:ph type="title"/>
+          </p:nvPr>
+        </p:nvSpPr>
+        <p:spPr>
+          <a:xfrm>
+            <a:off x="165093" y="365124"/>
+            <a:ext cx="2802278" cy="3063875"/>
+          </a:xfrm>
+        </p:spPr>
+        <p:txBody>
+          <a:bodyPr>
+            <a:normAutofit/>
+          </a:bodyPr>
+          <a:lstStyle/>
+          <a:p>
+            <a:r>
+              <a:rPr lang="en-US" sz="3200" dirty="0"/>
+              <a:t>P. aeruginosa water full </a:t>
+            </a:r>
+            <a:r>
+              <a:rPr lang="en-US" sz="3200" dirty="0" err="1"/>
+              <a:t>glm</a:t>
+            </a:r>
+            <a:br>
+              <a:rPr lang="en-US" sz="3200" dirty="0"/>
+            </a:br>
+            <a:r>
+              <a:rPr lang="en-US" sz="3200" dirty="0"/>
+              <a:t>-nothing significant</a:t>
+            </a:r>
+          </a:p>
+        </p:txBody>
+      </p:sp>
+      <p:pic>
+        <p:nvPicPr>
+          <p:cNvPr id="5" name="Picture 4">
+            <a:extLst>
+              <a:ext uri="{FF2B5EF4-FFF2-40B4-BE49-F238E27FC236}">
+                <a16:creationId xmlns:a16="http://schemas.microsoft.com/office/drawing/2014/main" id="{196C53B4-D1B6-15E1-D3AF-41F9C3B583E9}"/>
+              </a:ext>
+            </a:extLst>
+          </p:cNvPr>
+          <p:cNvPicPr>
+            <a:picLocks noChangeAspect="1"/>
+          </p:cNvPicPr>
+          <p:nvPr/>
+        </p:nvPicPr>
+        <p:blipFill>
+          <a:blip r:embed="rId2"/>
+          <a:stretch>
+            <a:fillRect/>
+          </a:stretch>
+        </p:blipFill>
+        <p:spPr>
+          <a:xfrm>
+            <a:off x="3271171" y="605291"/>
+            <a:ext cx="8535504" cy="4635575"/>
+          </a:xfrm>
+          <a:prstGeom prst="rect">
+            <a:avLst/>
+          </a:prstGeom>
+        </p:spPr>
+      </p:pic>
+    </p:spTree>
+    <p:extLst>
+      <p:ext uri="{BB962C8B-B14F-4D97-AF65-F5344CB8AC3E}">
+        <p14:creationId xmlns:p14="http://schemas.microsoft.com/office/powerpoint/2010/main" val="1203665239"/>
+      </p:ext>
+    </p:extLst>
+  </p:cSld>
+  <p:clrMapOvr>
+    <a:masterClrMapping/>
+  </p:clrMapOvr>
+</p:sld>
+</file>
+
+<file path=ppt/slides/slide27.xml><?xml version="1.0" encoding="utf-8"?>
+<p:sld xmlns:a="http://schemas.openxmlformats.org/drawingml/2006/main" xmlns:r="http://schemas.openxmlformats.org/officeDocument/2006/relationships" xmlns:p="http://schemas.openxmlformats.org/presentationml/2006/main">
+  <p:cSld>
+    <p:spTree>
+      <p:nvGrpSpPr>
+        <p:cNvPr id="1" name=""/>
+        <p:cNvGrpSpPr/>
+        <p:nvPr/>
+      </p:nvGrpSpPr>
+      <p:grpSpPr>
+        <a:xfrm>
+          <a:off x="0" y="0"/>
+          <a:ext cx="0" cy="0"/>
+          <a:chOff x="0" y="0"/>
+          <a:chExt cx="0" cy="0"/>
+        </a:xfrm>
+      </p:grpSpPr>
+      <p:sp>
+        <p:nvSpPr>
+          <p:cNvPr id="2" name="Title 1">
+            <a:extLst>
+              <a:ext uri="{FF2B5EF4-FFF2-40B4-BE49-F238E27FC236}">
+                <a16:creationId xmlns:a16="http://schemas.microsoft.com/office/drawing/2014/main" id="{3E4A6795-1948-05E4-E562-AFED99BDA8EB}"/>
+              </a:ext>
+            </a:extLst>
+          </p:cNvPr>
+          <p:cNvSpPr>
+            <a:spLocks noGrp="1"/>
+          </p:cNvSpPr>
+          <p:nvPr>
+            <p:ph type="title"/>
+          </p:nvPr>
+        </p:nvSpPr>
+        <p:spPr>
+          <a:xfrm>
+            <a:off x="165093" y="365124"/>
+            <a:ext cx="2802278" cy="3063875"/>
+          </a:xfrm>
+        </p:spPr>
+        <p:txBody>
+          <a:bodyPr>
+            <a:normAutofit/>
+          </a:bodyPr>
+          <a:lstStyle/>
+          <a:p>
+            <a:r>
+              <a:rPr lang="en-US" sz="3200" dirty="0"/>
+              <a:t>P. aeruginosa water step</a:t>
+            </a:r>
+            <a:br>
+              <a:rPr lang="en-US" sz="3200" dirty="0"/>
+            </a:br>
+            <a:r>
+              <a:rPr lang="en-US" sz="3200" dirty="0"/>
+              <a:t>-still nothing significant</a:t>
+            </a:r>
+          </a:p>
+        </p:txBody>
+      </p:sp>
+      <p:pic>
+        <p:nvPicPr>
+          <p:cNvPr id="4" name="Picture 3">
+            <a:extLst>
+              <a:ext uri="{FF2B5EF4-FFF2-40B4-BE49-F238E27FC236}">
+                <a16:creationId xmlns:a16="http://schemas.microsoft.com/office/drawing/2014/main" id="{EE579431-4984-DD87-CD21-D8A00CC57FFB}"/>
+              </a:ext>
+            </a:extLst>
+          </p:cNvPr>
+          <p:cNvPicPr>
+            <a:picLocks noChangeAspect="1"/>
+          </p:cNvPicPr>
+          <p:nvPr/>
+        </p:nvPicPr>
+        <p:blipFill>
+          <a:blip r:embed="rId2"/>
+          <a:stretch>
+            <a:fillRect/>
+          </a:stretch>
+        </p:blipFill>
+        <p:spPr>
+          <a:xfrm>
+            <a:off x="3711452" y="990474"/>
+            <a:ext cx="8461645" cy="4326593"/>
+          </a:xfrm>
+          <a:prstGeom prst="rect">
+            <a:avLst/>
+          </a:prstGeom>
+        </p:spPr>
+      </p:pic>
+    </p:spTree>
+    <p:extLst>
+      <p:ext uri="{BB962C8B-B14F-4D97-AF65-F5344CB8AC3E}">
+        <p14:creationId xmlns:p14="http://schemas.microsoft.com/office/powerpoint/2010/main" val="866700415"/>
+      </p:ext>
+    </p:extLst>
+  </p:cSld>
+  <p:clrMapOvr>
+    <a:masterClrMapping/>
+  </p:clrMapOvr>
+</p:sld>
+</file>
+
+<file path=ppt/slides/slide28.xml><?xml version="1.0" encoding="utf-8"?>
+<p:sld xmlns:a="http://schemas.openxmlformats.org/drawingml/2006/main" xmlns:r="http://schemas.openxmlformats.org/officeDocument/2006/relationships" xmlns:p="http://schemas.openxmlformats.org/presentationml/2006/main">
+  <p:cSld>
+    <p:spTree>
+      <p:nvGrpSpPr>
+        <p:cNvPr id="1" name=""/>
+        <p:cNvGrpSpPr/>
+        <p:nvPr/>
+      </p:nvGrpSpPr>
+      <p:grpSpPr>
+        <a:xfrm>
+          <a:off x="0" y="0"/>
+          <a:ext cx="0" cy="0"/>
+          <a:chOff x="0" y="0"/>
+          <a:chExt cx="0" cy="0"/>
+        </a:xfrm>
+      </p:grpSpPr>
+      <p:sp>
+        <p:nvSpPr>
+          <p:cNvPr id="2" name="Title 1">
+            <a:extLst>
+              <a:ext uri="{FF2B5EF4-FFF2-40B4-BE49-F238E27FC236}">
                 <a16:creationId xmlns:a16="http://schemas.microsoft.com/office/drawing/2014/main" id="{8AB59B44-7BB9-902F-4C8B-95F41F33EC3F}"/>
               </a:ext>
             </a:extLst>
@@ -4865,95 +5725,19 @@
           <a:chExt cx="0" cy="0"/>
         </a:xfrm>
       </p:grpSpPr>
-      <p:sp>
-        <p:nvSpPr>
-          <p:cNvPr id="2" name="Title 1">
-            <a:extLst>
-              <a:ext uri="{FF2B5EF4-FFF2-40B4-BE49-F238E27FC236}">
-                <a16:creationId xmlns:a16="http://schemas.microsoft.com/office/drawing/2014/main" id="{3E4A6795-1948-05E4-E562-AFED99BDA8EB}"/>
-              </a:ext>
-            </a:extLst>
-          </p:cNvPr>
-          <p:cNvSpPr>
-            <a:spLocks noGrp="1"/>
-          </p:cNvSpPr>
-          <p:nvPr>
-            <p:ph type="title"/>
-          </p:nvPr>
-        </p:nvSpPr>
-        <p:spPr>
-          <a:xfrm>
-            <a:off x="165093" y="365124"/>
-            <a:ext cx="2802278" cy="3063875"/>
-          </a:xfrm>
-        </p:spPr>
-        <p:txBody>
-          <a:bodyPr>
-            <a:normAutofit/>
-          </a:bodyPr>
-          <a:lstStyle/>
-          <a:p>
-            <a:r>
-              <a:rPr lang="en-US" sz="3200" dirty="0"/>
-              <a:t>S </a:t>
-            </a:r>
-            <a:r>
-              <a:rPr lang="en-US" sz="3200" dirty="0" err="1"/>
-              <a:t>maltophilia</a:t>
-            </a:r>
-            <a:r>
-              <a:rPr lang="en-US" sz="3200" dirty="0"/>
-              <a:t> </a:t>
-            </a:r>
-            <a:r>
-              <a:rPr lang="en-US" sz="3200" dirty="0" err="1"/>
-              <a:t>mp</a:t>
-            </a:r>
-            <a:r>
-              <a:rPr lang="en-US" sz="3200" dirty="0"/>
-              <a:t> full </a:t>
-            </a:r>
-            <a:r>
-              <a:rPr lang="en-US" sz="3200" dirty="0" err="1"/>
-              <a:t>glm</a:t>
-            </a:r>
-            <a:br>
-              <a:rPr lang="en-US" sz="3200" dirty="0"/>
-            </a:br>
-            <a:r>
-              <a:rPr lang="en-US" sz="3200" dirty="0"/>
-              <a:t>-time quadratic</a:t>
-            </a:r>
-            <a:br>
-              <a:rPr lang="en-US" sz="3200" dirty="0"/>
-            </a:br>
-            <a:r>
-              <a:rPr lang="en-US" sz="3200" dirty="0"/>
-              <a:t>-</a:t>
-            </a:r>
-            <a:r>
-              <a:rPr lang="en-US" sz="3200" dirty="0" err="1"/>
-              <a:t>ldpe</a:t>
-            </a:r>
-            <a:endParaRPr lang="en-US" sz="3200" dirty="0"/>
-          </a:p>
-        </p:txBody>
-      </p:sp>
       <p:pic>
         <p:nvPicPr>
-          <p:cNvPr id="7" name="Content Placeholder 6">
-            <a:extLst>
-              <a:ext uri="{FF2B5EF4-FFF2-40B4-BE49-F238E27FC236}">
-                <a16:creationId xmlns:a16="http://schemas.microsoft.com/office/drawing/2014/main" id="{6170284A-29D5-525E-782E-D118A135339F}"/>
+          <p:cNvPr id="5" name="Picture 4">
+            <a:extLst>
+              <a:ext uri="{FF2B5EF4-FFF2-40B4-BE49-F238E27FC236}">
+                <a16:creationId xmlns:a16="http://schemas.microsoft.com/office/drawing/2014/main" id="{C89A8D0F-4785-793E-5F59-940560DDD98D}"/>
               </a:ext>
             </a:extLst>
           </p:cNvPr>
           <p:cNvPicPr>
-            <a:picLocks noGrp="1" noChangeAspect="1"/>
+            <a:picLocks noChangeAspect="1"/>
           </p:cNvPicPr>
-          <p:nvPr>
-            <p:ph idx="1"/>
-          </p:nvPr>
+          <p:nvPr/>
         </p:nvPicPr>
         <p:blipFill>
           <a:blip r:embed="rId2"/>
@@ -4963,15 +5747,55 @@
         </p:blipFill>
         <p:spPr>
           <a:xfrm>
-            <a:off x="2967371" y="231775"/>
-            <a:ext cx="9059537" cy="6394450"/>
-          </a:xfrm>
+            <a:off x="3249768" y="1086678"/>
+            <a:ext cx="8472672" cy="5571747"/>
+          </a:xfrm>
+          <a:prstGeom prst="rect">
+            <a:avLst/>
+          </a:prstGeom>
         </p:spPr>
       </p:pic>
+      <p:sp>
+        <p:nvSpPr>
+          <p:cNvPr id="2" name="Title 1">
+            <a:extLst>
+              <a:ext uri="{FF2B5EF4-FFF2-40B4-BE49-F238E27FC236}">
+                <a16:creationId xmlns:a16="http://schemas.microsoft.com/office/drawing/2014/main" id="{9C84FB5B-3548-57AF-0BDE-3735ECDD4D50}"/>
+              </a:ext>
+            </a:extLst>
+          </p:cNvPr>
+          <p:cNvSpPr>
+            <a:spLocks noGrp="1"/>
+          </p:cNvSpPr>
+          <p:nvPr>
+            <p:ph type="title"/>
+          </p:nvPr>
+        </p:nvSpPr>
+        <p:spPr>
+          <a:xfrm>
+            <a:off x="0" y="0"/>
+            <a:ext cx="4664765" cy="1603513"/>
+          </a:xfrm>
+        </p:spPr>
+        <p:txBody>
+          <a:bodyPr/>
+          <a:lstStyle/>
+          <a:p>
+            <a:r>
+              <a:rPr lang="en-US" dirty="0" err="1"/>
+              <a:t>S_maltophilia</a:t>
+            </a:r>
+            <a:r>
+              <a:rPr lang="en-US" dirty="0"/>
+              <a:t> data transformation</a:t>
+            </a:r>
+          </a:p>
+        </p:txBody>
+      </p:sp>
     </p:spTree>
     <p:extLst>
       <p:ext uri="{BB962C8B-B14F-4D97-AF65-F5344CB8AC3E}">
-        <p14:creationId xmlns:p14="http://schemas.microsoft.com/office/powerpoint/2010/main" val="2366229804"/>
+        <p14:creationId xmlns:p14="http://schemas.microsoft.com/office/powerpoint/2010/main" val="4013227324"/>
       </p:ext>
     </p:extLst>
   </p:cSld>
@@ -5016,8 +5840,8 @@
         </p:nvSpPr>
         <p:spPr>
           <a:xfrm>
-            <a:off x="165093" y="365124"/>
-            <a:ext cx="2802278" cy="3063875"/>
+            <a:off x="0" y="248742"/>
+            <a:ext cx="2967371" cy="3180258"/>
           </a:xfrm>
         </p:spPr>
         <p:txBody>
@@ -5027,49 +5851,56 @@
           <a:lstStyle/>
           <a:p>
             <a:r>
-              <a:rPr lang="en-US" sz="3200" dirty="0"/>
+              <a:rPr lang="en-US" sz="2800" dirty="0"/>
               <a:t>S </a:t>
             </a:r>
             <a:r>
-              <a:rPr lang="en-US" sz="3200" dirty="0" err="1"/>
+              <a:rPr lang="en-US" sz="2800" dirty="0" err="1"/>
               <a:t>maltophilia</a:t>
             </a:r>
             <a:r>
-              <a:rPr lang="en-US" sz="3200" dirty="0"/>
+              <a:rPr lang="en-US" sz="2800" dirty="0"/>
               <a:t> </a:t>
             </a:r>
             <a:r>
-              <a:rPr lang="en-US" sz="3200" dirty="0" err="1"/>
+              <a:rPr lang="en-US" sz="2800" dirty="0" err="1"/>
               <a:t>mp</a:t>
             </a:r>
             <a:r>
-              <a:rPr lang="en-US" sz="3200" dirty="0"/>
-              <a:t> </a:t>
-            </a:r>
-            <a:r>
-              <a:rPr lang="en-US" sz="3200" dirty="0" err="1"/>
+              <a:rPr lang="en-US" sz="2800" dirty="0"/>
+              <a:t> full </a:t>
+            </a:r>
+            <a:r>
+              <a:rPr lang="en-US" sz="2800" dirty="0" err="1"/>
               <a:t>glm</a:t>
             </a:r>
             <a:r>
-              <a:rPr lang="en-US" sz="3200" dirty="0"/>
-              <a:t> step</a:t>
+              <a:rPr lang="en-US" sz="2800" dirty="0"/>
+              <a:t> (Box Cox)</a:t>
             </a:r>
             <a:br>
-              <a:rPr lang="en-US" sz="3200" dirty="0"/>
+              <a:rPr lang="en-US" sz="2800" dirty="0"/>
             </a:br>
             <a:r>
-              <a:rPr lang="en-US" sz="3200" dirty="0"/>
-              <a:t>-time only variable kept</a:t>
+              <a:rPr lang="en-US" sz="2800" dirty="0"/>
+              <a:t>-time linear</a:t>
+            </a:r>
+            <a:br>
+              <a:rPr lang="en-US" sz="2800" dirty="0"/>
+            </a:br>
+            <a:r>
+              <a:rPr lang="en-US" sz="2800" dirty="0"/>
+              <a:t>-water treatment effect</a:t>
             </a:r>
           </a:p>
         </p:txBody>
       </p:sp>
       <p:pic>
         <p:nvPicPr>
-          <p:cNvPr id="6" name="Picture 5">
-            <a:extLst>
-              <a:ext uri="{FF2B5EF4-FFF2-40B4-BE49-F238E27FC236}">
-                <a16:creationId xmlns:a16="http://schemas.microsoft.com/office/drawing/2014/main" id="{FB9DB6BF-963C-EC82-B9B3-AED1CF022083}"/>
+          <p:cNvPr id="4" name="Picture 3">
+            <a:extLst>
+              <a:ext uri="{FF2B5EF4-FFF2-40B4-BE49-F238E27FC236}">
+                <a16:creationId xmlns:a16="http://schemas.microsoft.com/office/drawing/2014/main" id="{C418A6DF-3876-3AC5-D105-8D78D20CCF2E}"/>
               </a:ext>
             </a:extLst>
           </p:cNvPr>
@@ -5086,8 +5917,8 @@
         </p:blipFill>
         <p:spPr>
           <a:xfrm>
-            <a:off x="2848406" y="1025663"/>
-            <a:ext cx="8875091" cy="4562336"/>
+            <a:off x="3071044" y="248741"/>
+            <a:ext cx="9120956" cy="6360515"/>
           </a:xfrm>
           <a:prstGeom prst="rect">
             <a:avLst/>
@@ -5097,7 +5928,7 @@
     </p:spTree>
     <p:extLst>
       <p:ext uri="{BB962C8B-B14F-4D97-AF65-F5344CB8AC3E}">
-        <p14:creationId xmlns:p14="http://schemas.microsoft.com/office/powerpoint/2010/main" val="3891756154"/>
+        <p14:creationId xmlns:p14="http://schemas.microsoft.com/office/powerpoint/2010/main" val="2366229804"/>
       </p:ext>
     </p:extLst>
   </p:cSld>
@@ -5143,18 +5974,26 @@
         <p:spPr>
           <a:xfrm>
             <a:off x="165093" y="365124"/>
-            <a:ext cx="1790707" cy="3063875"/>
+            <a:ext cx="2802278" cy="3063875"/>
           </a:xfrm>
         </p:spPr>
         <p:txBody>
           <a:bodyPr>
-            <a:normAutofit fontScale="90000"/>
+            <a:normAutofit/>
           </a:bodyPr>
           <a:lstStyle/>
           <a:p>
             <a:r>
               <a:rPr lang="en-US" sz="3200" dirty="0"/>
-              <a:t>Int1 </a:t>
+              <a:t>S </a:t>
+            </a:r>
+            <a:r>
+              <a:rPr lang="en-US" sz="3200" dirty="0" err="1"/>
+              <a:t>maltophilia</a:t>
+            </a:r>
+            <a:r>
+              <a:rPr lang="en-US" sz="3200" dirty="0"/>
+              <a:t> </a:t>
             </a:r>
             <a:r>
               <a:rPr lang="en-US" sz="3200" dirty="0" err="1"/>
@@ -5162,39 +6001,32 @@
             </a:r>
             <a:r>
               <a:rPr lang="en-US" sz="3200" dirty="0"/>
-              <a:t> full </a:t>
+              <a:t> </a:t>
             </a:r>
             <a:r>
               <a:rPr lang="en-US" sz="3200" dirty="0" err="1"/>
               <a:t>glm</a:t>
             </a:r>
+            <a:r>
+              <a:rPr lang="en-US" sz="3200" dirty="0"/>
+              <a:t> step</a:t>
+            </a:r>
             <a:br>
               <a:rPr lang="en-US" sz="3200" dirty="0"/>
             </a:br>
             <a:r>
               <a:rPr lang="en-US" sz="3200" dirty="0"/>
-              <a:t>-</a:t>
-            </a:r>
-            <a:r>
-              <a:rPr lang="en-US" sz="3200" dirty="0" err="1"/>
-              <a:t>ldpe</a:t>
-            </a:r>
-            <a:br>
-              <a:rPr lang="en-US" sz="3200" dirty="0"/>
-            </a:br>
-            <a:r>
-              <a:rPr lang="en-US" sz="3200" dirty="0"/>
-              <a:t>-evidence for time quadratic (p=0.1)</a:t>
+              <a:t>-time and water treatment variable kept</a:t>
             </a:r>
           </a:p>
         </p:txBody>
       </p:sp>
       <p:pic>
         <p:nvPicPr>
-          <p:cNvPr id="6" name="Picture 5">
-            <a:extLst>
-              <a:ext uri="{FF2B5EF4-FFF2-40B4-BE49-F238E27FC236}">
-                <a16:creationId xmlns:a16="http://schemas.microsoft.com/office/drawing/2014/main" id="{CD297939-C625-6466-D30F-B51A5D100749}"/>
+          <p:cNvPr id="4" name="Picture 3">
+            <a:extLst>
+              <a:ext uri="{FF2B5EF4-FFF2-40B4-BE49-F238E27FC236}">
+                <a16:creationId xmlns:a16="http://schemas.microsoft.com/office/drawing/2014/main" id="{A77D2CE5-7B61-9ECD-EFB3-10B87507648B}"/>
               </a:ext>
             </a:extLst>
           </p:cNvPr>
@@ -5211,8 +6043,8 @@
         </p:blipFill>
         <p:spPr>
           <a:xfrm>
-            <a:off x="2127579" y="230418"/>
-            <a:ext cx="9789262" cy="6262458"/>
+            <a:off x="2967371" y="365123"/>
+            <a:ext cx="9035352" cy="4869485"/>
           </a:xfrm>
           <a:prstGeom prst="rect">
             <a:avLst/>
@@ -5222,7 +6054,7 @@
     </p:spTree>
     <p:extLst>
       <p:ext uri="{BB962C8B-B14F-4D97-AF65-F5344CB8AC3E}">
-        <p14:creationId xmlns:p14="http://schemas.microsoft.com/office/powerpoint/2010/main" val="2898537562"/>
+        <p14:creationId xmlns:p14="http://schemas.microsoft.com/office/powerpoint/2010/main" val="3891756154"/>
       </p:ext>
     </p:extLst>
   </p:cSld>
@@ -5249,62 +6081,12 @@
           <a:chExt cx="0" cy="0"/>
         </a:xfrm>
       </p:grpSpPr>
-      <p:sp>
-        <p:nvSpPr>
-          <p:cNvPr id="2" name="Title 1">
-            <a:extLst>
-              <a:ext uri="{FF2B5EF4-FFF2-40B4-BE49-F238E27FC236}">
-                <a16:creationId xmlns:a16="http://schemas.microsoft.com/office/drawing/2014/main" id="{3E4A6795-1948-05E4-E562-AFED99BDA8EB}"/>
-              </a:ext>
-            </a:extLst>
-          </p:cNvPr>
-          <p:cNvSpPr>
-            <a:spLocks noGrp="1"/>
-          </p:cNvSpPr>
-          <p:nvPr>
-            <p:ph type="title"/>
-          </p:nvPr>
-        </p:nvSpPr>
-        <p:spPr>
-          <a:xfrm>
-            <a:off x="165093" y="365124"/>
-            <a:ext cx="2802278" cy="3063875"/>
-          </a:xfrm>
-        </p:spPr>
-        <p:txBody>
-          <a:bodyPr>
-            <a:normAutofit/>
-          </a:bodyPr>
-          <a:lstStyle/>
-          <a:p>
-            <a:r>
-              <a:rPr lang="en-US" sz="3200" dirty="0"/>
-              <a:t>Int1 </a:t>
-            </a:r>
-            <a:r>
-              <a:rPr lang="en-US" sz="3200" dirty="0" err="1"/>
-              <a:t>mp</a:t>
-            </a:r>
-            <a:r>
-              <a:rPr lang="en-US" sz="3200" dirty="0"/>
-              <a:t> step</a:t>
-            </a:r>
-            <a:br>
-              <a:rPr lang="en-US" sz="3200" dirty="0"/>
-            </a:br>
-            <a:r>
-              <a:rPr lang="en-US" sz="3200" dirty="0"/>
-              <a:t>- only time kept, linear or quadratic</a:t>
-            </a:r>
-          </a:p>
-        </p:txBody>
-      </p:sp>
       <p:pic>
         <p:nvPicPr>
-          <p:cNvPr id="4" name="Picture 3">
-            <a:extLst>
-              <a:ext uri="{FF2B5EF4-FFF2-40B4-BE49-F238E27FC236}">
-                <a16:creationId xmlns:a16="http://schemas.microsoft.com/office/drawing/2014/main" id="{50525DB7-EF23-5B9F-21B1-0D11D081758C}"/>
+          <p:cNvPr id="5" name="Picture 4">
+            <a:extLst>
+              <a:ext uri="{FF2B5EF4-FFF2-40B4-BE49-F238E27FC236}">
+                <a16:creationId xmlns:a16="http://schemas.microsoft.com/office/drawing/2014/main" id="{C89A8D0F-4785-793E-5F59-940560DDD98D}"/>
               </a:ext>
             </a:extLst>
           </p:cNvPr>
@@ -5321,18 +6103,55 @@
         </p:blipFill>
         <p:spPr>
           <a:xfrm>
-            <a:off x="2628094" y="930416"/>
-            <a:ext cx="9563906" cy="4708384"/>
+            <a:off x="3249768" y="1086678"/>
+            <a:ext cx="8472672" cy="5571747"/>
           </a:xfrm>
           <a:prstGeom prst="rect">
             <a:avLst/>
           </a:prstGeom>
         </p:spPr>
       </p:pic>
+      <p:sp>
+        <p:nvSpPr>
+          <p:cNvPr id="2" name="Title 1">
+            <a:extLst>
+              <a:ext uri="{FF2B5EF4-FFF2-40B4-BE49-F238E27FC236}">
+                <a16:creationId xmlns:a16="http://schemas.microsoft.com/office/drawing/2014/main" id="{9C84FB5B-3548-57AF-0BDE-3735ECDD4D50}"/>
+              </a:ext>
+            </a:extLst>
+          </p:cNvPr>
+          <p:cNvSpPr>
+            <a:spLocks noGrp="1"/>
+          </p:cNvSpPr>
+          <p:nvPr>
+            <p:ph type="title"/>
+          </p:nvPr>
+        </p:nvSpPr>
+        <p:spPr>
+          <a:xfrm>
+            <a:off x="0" y="0"/>
+            <a:ext cx="4664765" cy="1603513"/>
+          </a:xfrm>
+        </p:spPr>
+        <p:txBody>
+          <a:bodyPr/>
+          <a:lstStyle/>
+          <a:p>
+            <a:r>
+              <a:rPr lang="en-US" dirty="0" err="1"/>
+              <a:t>S_maltophilia</a:t>
+            </a:r>
+            <a:r>
+              <a:rPr lang="en-US" dirty="0"/>
+              <a:t> data transformation</a:t>
+            </a:r>
+          </a:p>
+        </p:txBody>
+      </p:sp>
     </p:spTree>
     <p:extLst>
       <p:ext uri="{BB962C8B-B14F-4D97-AF65-F5344CB8AC3E}">
-        <p14:creationId xmlns:p14="http://schemas.microsoft.com/office/powerpoint/2010/main" val="746536640"/>
+        <p14:creationId xmlns:p14="http://schemas.microsoft.com/office/powerpoint/2010/main" val="450193634"/>
       </p:ext>
     </p:extLst>
   </p:cSld>
@@ -5378,18 +6197,18 @@
         <p:spPr>
           <a:xfrm>
             <a:off x="165093" y="365124"/>
-            <a:ext cx="2205574" cy="3063875"/>
+            <a:ext cx="1790707" cy="3063875"/>
           </a:xfrm>
         </p:spPr>
         <p:txBody>
           <a:bodyPr>
-            <a:normAutofit/>
+            <a:normAutofit fontScale="90000"/>
           </a:bodyPr>
           <a:lstStyle/>
           <a:p>
             <a:r>
               <a:rPr lang="en-US" sz="3200" dirty="0"/>
-              <a:t>Sul1 </a:t>
+              <a:t>Int1 </a:t>
             </a:r>
             <a:r>
               <a:rPr lang="en-US" sz="3200" dirty="0" err="1"/>
@@ -5419,28 +6238,17 @@
             </a:br>
             <a:r>
               <a:rPr lang="en-US" sz="3200" dirty="0"/>
-              <a:t>-</a:t>
-            </a:r>
-            <a:r>
-              <a:rPr lang="en-US" sz="3200" dirty="0" err="1"/>
-              <a:t>tww</a:t>
-            </a:r>
-            <a:br>
-              <a:rPr lang="en-US" sz="3200" dirty="0"/>
-            </a:br>
-            <a:r>
-              <a:rPr lang="en-US" sz="3200" dirty="0"/>
-              <a:t>-time quadratic</a:t>
+              <a:t>-evidence for time quadratic (p=0.1)</a:t>
             </a:r>
           </a:p>
         </p:txBody>
       </p:sp>
       <p:pic>
         <p:nvPicPr>
-          <p:cNvPr id="5" name="Picture 4">
-            <a:extLst>
-              <a:ext uri="{FF2B5EF4-FFF2-40B4-BE49-F238E27FC236}">
-                <a16:creationId xmlns:a16="http://schemas.microsoft.com/office/drawing/2014/main" id="{34A95C8F-3B63-CCF5-CED3-67E6F3D400DB}"/>
+          <p:cNvPr id="6" name="Picture 5">
+            <a:extLst>
+              <a:ext uri="{FF2B5EF4-FFF2-40B4-BE49-F238E27FC236}">
+                <a16:creationId xmlns:a16="http://schemas.microsoft.com/office/drawing/2014/main" id="{CD297939-C625-6466-D30F-B51A5D100749}"/>
               </a:ext>
             </a:extLst>
           </p:cNvPr>
@@ -5457,8 +6265,8 @@
         </p:blipFill>
         <p:spPr>
           <a:xfrm>
-            <a:off x="2522898" y="269772"/>
-            <a:ext cx="9659258" cy="5868561"/>
+            <a:off x="2127579" y="230418"/>
+            <a:ext cx="9789262" cy="6262458"/>
           </a:xfrm>
           <a:prstGeom prst="rect">
             <a:avLst/>
@@ -5468,7 +6276,7 @@
     </p:spTree>
     <p:extLst>
       <p:ext uri="{BB962C8B-B14F-4D97-AF65-F5344CB8AC3E}">
-        <p14:creationId xmlns:p14="http://schemas.microsoft.com/office/powerpoint/2010/main" val="2800811628"/>
+        <p14:creationId xmlns:p14="http://schemas.microsoft.com/office/powerpoint/2010/main" val="2898537562"/>
       </p:ext>
     </p:extLst>
   </p:cSld>
@@ -5525,7 +6333,7 @@
           <a:p>
             <a:r>
               <a:rPr lang="en-US" sz="3200" dirty="0"/>
-              <a:t>Sul1 </a:t>
+              <a:t>Int1 </a:t>
             </a:r>
             <a:r>
               <a:rPr lang="en-US" sz="3200" dirty="0" err="1"/>
@@ -5540,14 +6348,7 @@
             </a:br>
             <a:r>
               <a:rPr lang="en-US" sz="3200" dirty="0"/>
-              <a:t>-everything kept</a:t>
-            </a:r>
-            <a:br>
-              <a:rPr lang="en-US" sz="3200" dirty="0"/>
-            </a:br>
-            <a:r>
-              <a:rPr lang="en-US" sz="3200" dirty="0"/>
-              <a:t>-time quadratic</a:t>
+              <a:t>- only time kept, linear or quadratic</a:t>
             </a:r>
           </a:p>
         </p:txBody>
@@ -5557,7 +6358,7 @@
           <p:cNvPr id="4" name="Picture 3">
             <a:extLst>
               <a:ext uri="{FF2B5EF4-FFF2-40B4-BE49-F238E27FC236}">
-                <a16:creationId xmlns:a16="http://schemas.microsoft.com/office/drawing/2014/main" id="{C2860583-85BD-F14A-501D-0D27502CA973}"/>
+                <a16:creationId xmlns:a16="http://schemas.microsoft.com/office/drawing/2014/main" id="{50525DB7-EF23-5B9F-21B1-0D11D081758C}"/>
               </a:ext>
             </a:extLst>
           </p:cNvPr>
@@ -5574,8 +6375,8 @@
         </p:blipFill>
         <p:spPr>
           <a:xfrm>
-            <a:off x="3036806" y="609599"/>
-            <a:ext cx="9112906" cy="5579533"/>
+            <a:off x="2628094" y="930416"/>
+            <a:ext cx="9563906" cy="4708384"/>
           </a:xfrm>
           <a:prstGeom prst="rect">
             <a:avLst/>
@@ -5585,7 +6386,7 @@
     </p:spTree>
     <p:extLst>
       <p:ext uri="{BB962C8B-B14F-4D97-AF65-F5344CB8AC3E}">
-        <p14:creationId xmlns:p14="http://schemas.microsoft.com/office/powerpoint/2010/main" val="3020057500"/>
+        <p14:creationId xmlns:p14="http://schemas.microsoft.com/office/powerpoint/2010/main" val="746536640"/>
       </p:ext>
     </p:extLst>
   </p:cSld>
@@ -5612,66 +6413,12 @@
           <a:chExt cx="0" cy="0"/>
         </a:xfrm>
       </p:grpSpPr>
-      <p:sp>
-        <p:nvSpPr>
-          <p:cNvPr id="2" name="Title 1">
-            <a:extLst>
-              <a:ext uri="{FF2B5EF4-FFF2-40B4-BE49-F238E27FC236}">
-                <a16:creationId xmlns:a16="http://schemas.microsoft.com/office/drawing/2014/main" id="{3E4A6795-1948-05E4-E562-AFED99BDA8EB}"/>
-              </a:ext>
-            </a:extLst>
-          </p:cNvPr>
-          <p:cNvSpPr>
-            <a:spLocks noGrp="1"/>
-          </p:cNvSpPr>
-          <p:nvPr>
-            <p:ph type="title"/>
-          </p:nvPr>
-        </p:nvSpPr>
-        <p:spPr>
-          <a:xfrm>
-            <a:off x="97360" y="847724"/>
-            <a:ext cx="2380029" cy="3063875"/>
-          </a:xfrm>
-        </p:spPr>
-        <p:txBody>
-          <a:bodyPr>
-            <a:normAutofit/>
-          </a:bodyPr>
-          <a:lstStyle/>
-          <a:p>
-            <a:r>
-              <a:rPr lang="en-US" sz="3200" dirty="0"/>
-              <a:t>P. aeruginosa </a:t>
-            </a:r>
-            <a:r>
-              <a:rPr lang="en-US" sz="3200" dirty="0" err="1"/>
-              <a:t>mp</a:t>
-            </a:r>
-            <a:r>
-              <a:rPr lang="en-US" sz="3200" dirty="0"/>
-              <a:t> full </a:t>
-            </a:r>
-            <a:r>
-              <a:rPr lang="en-US" sz="3200" dirty="0" err="1"/>
-              <a:t>glm</a:t>
-            </a:r>
-            <a:br>
-              <a:rPr lang="en-US" sz="3200" dirty="0"/>
-            </a:br>
-            <a:r>
-              <a:rPr lang="en-US" sz="3200" dirty="0"/>
-              <a:t>-time quadratic with p=0.1</a:t>
-            </a:r>
-          </a:p>
-        </p:txBody>
-      </p:sp>
       <p:pic>
         <p:nvPicPr>
           <p:cNvPr id="5" name="Picture 4">
             <a:extLst>
               <a:ext uri="{FF2B5EF4-FFF2-40B4-BE49-F238E27FC236}">
-                <a16:creationId xmlns:a16="http://schemas.microsoft.com/office/drawing/2014/main" id="{9721CBB1-14D9-DF8C-F14D-DCD4F9809A35}"/>
+                <a16:creationId xmlns:a16="http://schemas.microsoft.com/office/drawing/2014/main" id="{C89A8D0F-4785-793E-5F59-940560DDD98D}"/>
               </a:ext>
             </a:extLst>
           </p:cNvPr>
@@ -5688,18 +6435,55 @@
         </p:blipFill>
         <p:spPr>
           <a:xfrm>
-            <a:off x="2545122" y="77159"/>
-            <a:ext cx="9728919" cy="5773308"/>
+            <a:off x="3249768" y="1086678"/>
+            <a:ext cx="8472672" cy="5571747"/>
           </a:xfrm>
           <a:prstGeom prst="rect">
             <a:avLst/>
           </a:prstGeom>
         </p:spPr>
       </p:pic>
+      <p:sp>
+        <p:nvSpPr>
+          <p:cNvPr id="2" name="Title 1">
+            <a:extLst>
+              <a:ext uri="{FF2B5EF4-FFF2-40B4-BE49-F238E27FC236}">
+                <a16:creationId xmlns:a16="http://schemas.microsoft.com/office/drawing/2014/main" id="{9C84FB5B-3548-57AF-0BDE-3735ECDD4D50}"/>
+              </a:ext>
+            </a:extLst>
+          </p:cNvPr>
+          <p:cNvSpPr>
+            <a:spLocks noGrp="1"/>
+          </p:cNvSpPr>
+          <p:nvPr>
+            <p:ph type="title"/>
+          </p:nvPr>
+        </p:nvSpPr>
+        <p:spPr>
+          <a:xfrm>
+            <a:off x="0" y="0"/>
+            <a:ext cx="4664765" cy="1603513"/>
+          </a:xfrm>
+        </p:spPr>
+        <p:txBody>
+          <a:bodyPr/>
+          <a:lstStyle/>
+          <a:p>
+            <a:r>
+              <a:rPr lang="en-US" dirty="0" err="1"/>
+              <a:t>S_maltophilia</a:t>
+            </a:r>
+            <a:r>
+              <a:rPr lang="en-US" dirty="0"/>
+              <a:t> data transformation</a:t>
+            </a:r>
+          </a:p>
+        </p:txBody>
+      </p:sp>
     </p:spTree>
     <p:extLst>
       <p:ext uri="{BB962C8B-B14F-4D97-AF65-F5344CB8AC3E}">
-        <p14:creationId xmlns:p14="http://schemas.microsoft.com/office/powerpoint/2010/main" val="1248416635"/>
+        <p14:creationId xmlns:p14="http://schemas.microsoft.com/office/powerpoint/2010/main" val="3972327607"/>
       </p:ext>
     </p:extLst>
   </p:cSld>

</xml_diff>